<commit_message>
add createcommand, changer routage, try update 2 tables by only commande
</commit_message>
<xml_diff>
--- a/WCF/8.WebApi.pptx
+++ b/WCF/8.WebApi.pptx
@@ -6,19 +6,37 @@
   </p:sldMasterIdLst>
   <p:sldIdLst>
     <p:sldId id="256" r:id="rId2"/>
-    <p:sldId id="258" r:id="rId3"/>
-    <p:sldId id="257" r:id="rId4"/>
-    <p:sldId id="259" r:id="rId5"/>
-    <p:sldId id="260" r:id="rId6"/>
-    <p:sldId id="262" r:id="rId7"/>
-    <p:sldId id="261" r:id="rId8"/>
-    <p:sldId id="263" r:id="rId9"/>
-    <p:sldId id="264" r:id="rId10"/>
-    <p:sldId id="265" r:id="rId11"/>
-    <p:sldId id="268" r:id="rId12"/>
-    <p:sldId id="266" r:id="rId13"/>
-    <p:sldId id="269" r:id="rId14"/>
-    <p:sldId id="267" r:id="rId15"/>
+    <p:sldId id="277" r:id="rId3"/>
+    <p:sldId id="258" r:id="rId4"/>
+    <p:sldId id="257" r:id="rId5"/>
+    <p:sldId id="259" r:id="rId6"/>
+    <p:sldId id="260" r:id="rId7"/>
+    <p:sldId id="270" r:id="rId8"/>
+    <p:sldId id="262" r:id="rId9"/>
+    <p:sldId id="261" r:id="rId10"/>
+    <p:sldId id="263" r:id="rId11"/>
+    <p:sldId id="264" r:id="rId12"/>
+    <p:sldId id="271" r:id="rId13"/>
+    <p:sldId id="265" r:id="rId14"/>
+    <p:sldId id="272" r:id="rId15"/>
+    <p:sldId id="273" r:id="rId16"/>
+    <p:sldId id="268" r:id="rId17"/>
+    <p:sldId id="274" r:id="rId18"/>
+    <p:sldId id="266" r:id="rId19"/>
+    <p:sldId id="275" r:id="rId20"/>
+    <p:sldId id="267" r:id="rId21"/>
+    <p:sldId id="276" r:id="rId22"/>
+    <p:sldId id="278" r:id="rId23"/>
+    <p:sldId id="279" r:id="rId24"/>
+    <p:sldId id="280" r:id="rId25"/>
+    <p:sldId id="269" r:id="rId26"/>
+    <p:sldId id="281" r:id="rId27"/>
+    <p:sldId id="282" r:id="rId28"/>
+    <p:sldId id="283" r:id="rId29"/>
+    <p:sldId id="285" r:id="rId30"/>
+    <p:sldId id="284" r:id="rId31"/>
+    <p:sldId id="286" r:id="rId32"/>
+    <p:sldId id="287" r:id="rId33"/>
   </p:sldIdLst>
   <p:sldSz cx="12192000" cy="6858000"/>
   <p:notesSz cx="6858000" cy="9144000"/>
@@ -117,6 +135,11 @@
       </a:defRPr>
     </a:lvl9pPr>
   </p:defaultTextStyle>
+  <p:extLst>
+    <p:ext uri="{EFAFB233-063F-42B5-8137-9DF3F51BA10A}">
+      <p15:sldGuideLst xmlns:p15="http://schemas.microsoft.com/office/powerpoint/2012/main"/>
+    </p:ext>
+  </p:extLst>
 </p:presentation>
 </file>
 
@@ -456,7 +479,7 @@
             <a:fld id="{5923F103-BC34-4FE4-A40E-EDDEECFDA5D0}" type="datetimeFigureOut">
               <a:rPr lang="en-US" dirty="0"/>
               <a:pPr/>
-              <a:t>4/27/2019</a:t>
+              <a:t>5/1/2019</a:t>
             </a:fld>
             <a:endParaRPr lang="en-US" dirty="0"/>
           </a:p>
@@ -1544,7 +1567,7 @@
           <a:p>
             <a:fld id="{923A1CC3-2375-41D4-9E03-427CAF2A4C1A}" type="datetimeFigureOut">
               <a:rPr lang="en-US" dirty="0"/>
-              <a:t>4/27/2019</a:t>
+              <a:t>5/1/2019</a:t>
             </a:fld>
             <a:endParaRPr lang="en-US" dirty="0"/>
           </a:p>
@@ -2524,7 +2547,7 @@
           <a:p>
             <a:fld id="{AFF16868-8199-4C2C-A5B1-63AEE139F88E}" type="datetimeFigureOut">
               <a:rPr lang="en-US" dirty="0"/>
-              <a:t>4/27/2019</a:t>
+              <a:t>5/1/2019</a:t>
             </a:fld>
             <a:endParaRPr lang="en-US" dirty="0"/>
           </a:p>
@@ -3658,7 +3681,7 @@
           <a:p>
             <a:fld id="{AAD9FF7F-6988-44CC-821B-644E70CD2F73}" type="datetimeFigureOut">
               <a:rPr lang="en-US" dirty="0"/>
-              <a:t>4/27/2019</a:t>
+              <a:t>5/1/2019</a:t>
             </a:fld>
             <a:endParaRPr lang="en-US" dirty="0"/>
           </a:p>
@@ -4691,7 +4714,7 @@
           <a:p>
             <a:fld id="{5C12C299-16B2-4475-990D-751901EACC14}" type="datetimeFigureOut">
               <a:rPr lang="en-US" dirty="0"/>
-              <a:t>4/27/2019</a:t>
+              <a:t>5/1/2019</a:t>
             </a:fld>
             <a:endParaRPr lang="en-US" dirty="0"/>
           </a:p>
@@ -5351,7 +5374,7 @@
           <a:p>
             <a:fld id="{9FE86839-B9D8-4651-8783-F325ECE74E65}" type="datetimeFigureOut">
               <a:rPr lang="en-US" dirty="0"/>
-              <a:t>4/27/2019</a:t>
+              <a:t>5/1/2019</a:t>
             </a:fld>
             <a:endParaRPr lang="en-US" dirty="0"/>
           </a:p>
@@ -6212,7 +6235,7 @@
           <a:p>
             <a:fld id="{FD484F64-32F6-45C5-931F-ADC1662401D0}" type="datetimeFigureOut">
               <a:rPr lang="en-US" dirty="0"/>
-              <a:t>4/27/2019</a:t>
+              <a:t>5/1/2019</a:t>
             </a:fld>
             <a:endParaRPr lang="en-US" dirty="0"/>
           </a:p>
@@ -6402,7 +6425,7 @@
           <a:p>
             <a:fld id="{53086D93-FCAC-47E0-A2EE-787E62CA814C}" type="datetimeFigureOut">
               <a:rPr lang="en-US" dirty="0"/>
-              <a:t>4/27/2019</a:t>
+              <a:t>5/1/2019</a:t>
             </a:fld>
             <a:endParaRPr lang="en-US" dirty="0"/>
           </a:p>
@@ -7374,7 +7397,7 @@
           <a:p>
             <a:fld id="{CDA879A6-0FD0-4734-A311-86BFCA472E6E}" type="datetimeFigureOut">
               <a:rPr lang="en-US" dirty="0"/>
-              <a:t>4/27/2019</a:t>
+              <a:t>5/1/2019</a:t>
             </a:fld>
             <a:endParaRPr lang="en-US" dirty="0"/>
           </a:p>
@@ -7585,7 +7608,7 @@
           <a:p>
             <a:fld id="{19C9CA7B-DFD4-44B5-8C60-D14B8CD1FB59}" type="datetimeFigureOut">
               <a:rPr lang="en-US" dirty="0"/>
-              <a:t>4/27/2019</a:t>
+              <a:t>5/1/2019</a:t>
             </a:fld>
             <a:endParaRPr lang="en-US" dirty="0"/>
           </a:p>
@@ -8619,7 +8642,7 @@
           <a:p>
             <a:fld id="{F34E6425-0181-43F2-84FC-787E803FD2F8}" type="datetimeFigureOut">
               <a:rPr lang="en-US" dirty="0"/>
-              <a:t>4/27/2019</a:t>
+              <a:t>5/1/2019</a:t>
             </a:fld>
             <a:endParaRPr lang="en-US" dirty="0"/>
           </a:p>
@@ -8891,7 +8914,7 @@
           <a:p>
             <a:fld id="{3BDB8791-F1B0-41E7-B7FD-A781E65C4266}" type="datetimeFigureOut">
               <a:rPr lang="en-US" dirty="0"/>
-              <a:t>4/27/2019</a:t>
+              <a:t>5/1/2019</a:t>
             </a:fld>
             <a:endParaRPr lang="en-US" dirty="0"/>
           </a:p>
@@ -9301,7 +9324,7 @@
           <a:p>
             <a:fld id="{5FDD63B2-E120-4ED8-B27B-C685F510A5FE}" type="datetimeFigureOut">
               <a:rPr lang="en-US" dirty="0"/>
-              <a:t>4/27/2019</a:t>
+              <a:t>5/1/2019</a:t>
             </a:fld>
             <a:endParaRPr lang="en-US" dirty="0"/>
           </a:p>
@@ -9428,7 +9451,7 @@
           <a:p>
             <a:fld id="{7AA18ACC-A947-437B-A130-35BD54FDF1E9}" type="datetimeFigureOut">
               <a:rPr lang="en-US" dirty="0"/>
-              <a:t>4/27/2019</a:t>
+              <a:t>5/1/2019</a:t>
             </a:fld>
             <a:endParaRPr lang="en-US" dirty="0"/>
           </a:p>
@@ -9523,7 +9546,7 @@
           <a:p>
             <a:fld id="{7C8D7E02-BCB8-4D50-A234-369438C08659}" type="datetimeFigureOut">
               <a:rPr lang="en-US" dirty="0"/>
-              <a:t>4/27/2019</a:t>
+              <a:t>5/1/2019</a:t>
             </a:fld>
             <a:endParaRPr lang="en-US" dirty="0"/>
           </a:p>
@@ -10604,7 +10627,7 @@
           <a:p>
             <a:fld id="{76E86A4C-8E40-4F87-A4F0-01A0687C5742}" type="datetimeFigureOut">
               <a:rPr lang="en-US" dirty="0"/>
-              <a:t>4/27/2019</a:t>
+              <a:t>5/1/2019</a:t>
             </a:fld>
             <a:endParaRPr lang="en-US" dirty="0"/>
           </a:p>
@@ -11712,7 +11735,7 @@
           <a:p>
             <a:fld id="{35E72C73-2D91-4E12-BA25-F0AA0C03599B}" type="datetimeFigureOut">
               <a:rPr lang="en-US" dirty="0"/>
-              <a:t>4/27/2019</a:t>
+              <a:t>5/1/2019</a:t>
             </a:fld>
             <a:endParaRPr lang="en-US" dirty="0"/>
           </a:p>
@@ -12709,7 +12732,7 @@
           <a:p>
             <a:fld id="{2BE451C3-0FF4-47C4-B829-773ADF60F88C}" type="datetimeFigureOut">
               <a:rPr lang="en-US" dirty="0"/>
-              <a:t>4/27/2019</a:t>
+              <a:t>5/1/2019</a:t>
             </a:fld>
             <a:endParaRPr lang="en-US" dirty="0"/>
           </a:p>
@@ -13362,6 +13385,294 @@
           <a:p>
             <a:r>
               <a:rPr lang="fr-FR" smtClean="0"/>
+              <a:t>Créer un nouveau controlleur</a:t>
+            </a:r>
+            <a:endParaRPr lang="fr-FR"/>
+          </a:p>
+        </p:txBody>
+      </p:sp>
+      <p:pic>
+        <p:nvPicPr>
+          <p:cNvPr id="4" name="Content Placeholder 3"/>
+          <p:cNvPicPr>
+            <a:picLocks noGrp="1" noChangeAspect="1"/>
+          </p:cNvPicPr>
+          <p:nvPr>
+            <p:ph idx="1"/>
+          </p:nvPr>
+        </p:nvPicPr>
+        <p:blipFill>
+          <a:blip r:embed="rId2"/>
+          <a:stretch>
+            <a:fillRect/>
+          </a:stretch>
+        </p:blipFill>
+        <p:spPr>
+          <a:xfrm>
+            <a:off x="2772035" y="2603500"/>
+            <a:ext cx="5592242" cy="3416300"/>
+          </a:xfrm>
+          <a:prstGeom prst="rect">
+            <a:avLst/>
+          </a:prstGeom>
+        </p:spPr>
+      </p:pic>
+    </p:spTree>
+    <p:extLst>
+      <p:ext uri="{BB962C8B-B14F-4D97-AF65-F5344CB8AC3E}">
+        <p14:creationId xmlns:p14="http://schemas.microsoft.com/office/powerpoint/2010/main" val="1990699872"/>
+      </p:ext>
+    </p:extLst>
+  </p:cSld>
+  <p:clrMapOvr>
+    <a:masterClrMapping/>
+  </p:clrMapOvr>
+</p:sld>
+</file>
+
+<file path=ppt/slides/slide11.xml><?xml version="1.0" encoding="utf-8"?>
+<p:sld xmlns:a="http://schemas.openxmlformats.org/drawingml/2006/main" xmlns:r="http://schemas.openxmlformats.org/officeDocument/2006/relationships" xmlns:p="http://schemas.openxmlformats.org/presentationml/2006/main">
+  <p:cSld>
+    <p:spTree>
+      <p:nvGrpSpPr>
+        <p:cNvPr id="1" name=""/>
+        <p:cNvGrpSpPr/>
+        <p:nvPr/>
+      </p:nvGrpSpPr>
+      <p:grpSpPr>
+        <a:xfrm>
+          <a:off x="0" y="0"/>
+          <a:ext cx="0" cy="0"/>
+          <a:chOff x="0" y="0"/>
+          <a:chExt cx="0" cy="0"/>
+        </a:xfrm>
+      </p:grpSpPr>
+      <p:sp>
+        <p:nvSpPr>
+          <p:cNvPr id="2" name="Title 1"/>
+          <p:cNvSpPr>
+            <a:spLocks noGrp="1"/>
+          </p:cNvSpPr>
+          <p:nvPr>
+            <p:ph type="title"/>
+          </p:nvPr>
+        </p:nvSpPr>
+        <p:spPr/>
+        <p:txBody>
+          <a:bodyPr/>
+          <a:lstStyle/>
+          <a:p>
+            <a:r>
+              <a:rPr lang="fr-FR" smtClean="0"/>
+              <a:t>Serialisation</a:t>
+            </a:r>
+            <a:endParaRPr lang="fr-FR"/>
+          </a:p>
+        </p:txBody>
+      </p:sp>
+      <p:sp>
+        <p:nvSpPr>
+          <p:cNvPr id="3" name="Content Placeholder 2"/>
+          <p:cNvSpPr>
+            <a:spLocks noGrp="1"/>
+          </p:cNvSpPr>
+          <p:nvPr>
+            <p:ph idx="1"/>
+          </p:nvPr>
+        </p:nvSpPr>
+        <p:spPr/>
+        <p:txBody>
+          <a:bodyPr/>
+          <a:lstStyle/>
+          <a:p>
+            <a:r>
+              <a:rPr lang="fr-FR" smtClean="0"/>
+              <a:t>WebApi va retourner nativement </a:t>
+            </a:r>
+            <a:r>
+              <a:rPr lang="fr-FR" smtClean="0"/>
+              <a:t>les </a:t>
+            </a:r>
+            <a:r>
+              <a:rPr lang="fr-FR" smtClean="0"/>
+              <a:t>données dans le format dans le quel on lui demande</a:t>
+            </a:r>
+          </a:p>
+          <a:p>
+            <a:r>
+              <a:rPr lang="fr-FR" smtClean="0"/>
+              <a:t>Le client spécifie son format préféré de données dans le champ Accept</a:t>
+            </a:r>
+            <a:r>
+              <a:rPr lang="fr-FR" smtClean="0"/>
+              <a:t>.</a:t>
+            </a:r>
+          </a:p>
+          <a:p>
+            <a:endParaRPr lang="fr-FR"/>
+          </a:p>
+          <a:p>
+            <a:r>
+              <a:rPr lang="fr-FR" smtClean="0"/>
+              <a:t>Démo avec Fiddler et Champ Accept : </a:t>
+            </a:r>
+            <a:endParaRPr lang="fr-FR"/>
+          </a:p>
+        </p:txBody>
+      </p:sp>
+    </p:spTree>
+    <p:extLst>
+      <p:ext uri="{BB962C8B-B14F-4D97-AF65-F5344CB8AC3E}">
+        <p14:creationId xmlns:p14="http://schemas.microsoft.com/office/powerpoint/2010/main" val="2383675836"/>
+      </p:ext>
+    </p:extLst>
+  </p:cSld>
+  <p:clrMapOvr>
+    <a:masterClrMapping/>
+  </p:clrMapOvr>
+</p:sld>
+</file>
+
+<file path=ppt/slides/slide12.xml><?xml version="1.0" encoding="utf-8"?>
+<p:sld xmlns:a="http://schemas.openxmlformats.org/drawingml/2006/main" xmlns:r="http://schemas.openxmlformats.org/officeDocument/2006/relationships" xmlns:p="http://schemas.openxmlformats.org/presentationml/2006/main">
+  <p:cSld>
+    <p:spTree>
+      <p:nvGrpSpPr>
+        <p:cNvPr id="1" name=""/>
+        <p:cNvGrpSpPr/>
+        <p:nvPr/>
+      </p:nvGrpSpPr>
+      <p:grpSpPr>
+        <a:xfrm>
+          <a:off x="0" y="0"/>
+          <a:ext cx="0" cy="0"/>
+          <a:chOff x="0" y="0"/>
+          <a:chExt cx="0" cy="0"/>
+        </a:xfrm>
+      </p:grpSpPr>
+      <p:sp>
+        <p:nvSpPr>
+          <p:cNvPr id="2" name="Title 1"/>
+          <p:cNvSpPr>
+            <a:spLocks noGrp="1"/>
+          </p:cNvSpPr>
+          <p:nvPr>
+            <p:ph type="title"/>
+          </p:nvPr>
+        </p:nvSpPr>
+        <p:spPr/>
+        <p:txBody>
+          <a:bodyPr/>
+          <a:lstStyle/>
+          <a:p>
+            <a:r>
+              <a:rPr lang="fr-FR" smtClean="0"/>
+              <a:t>Pendu : Exercice</a:t>
+            </a:r>
+            <a:endParaRPr lang="fr-FR"/>
+          </a:p>
+        </p:txBody>
+      </p:sp>
+      <p:sp>
+        <p:nvSpPr>
+          <p:cNvPr id="3" name="Content Placeholder 2"/>
+          <p:cNvSpPr>
+            <a:spLocks noGrp="1"/>
+          </p:cNvSpPr>
+          <p:nvPr>
+            <p:ph idx="1"/>
+          </p:nvPr>
+        </p:nvSpPr>
+        <p:spPr/>
+        <p:txBody>
+          <a:bodyPr/>
+          <a:lstStyle/>
+          <a:p>
+            <a:r>
+              <a:rPr lang="fr-FR" smtClean="0"/>
+              <a:t>Création d’une base de données + de la table PartiePendu</a:t>
+            </a:r>
+          </a:p>
+          <a:p>
+            <a:r>
+              <a:rPr lang="fr-FR" smtClean="0"/>
+              <a:t>Création d’un projet WebAPI</a:t>
+            </a:r>
+          </a:p>
+          <a:p>
+            <a:r>
+              <a:rPr lang="fr-FR" smtClean="0"/>
+              <a:t>Modification du projet pour travailler avec Entity Framework</a:t>
+            </a:r>
+          </a:p>
+          <a:p>
+            <a:r>
+              <a:rPr lang="fr-FR" smtClean="0"/>
+              <a:t>Ajout de lignes dans la table PartiePendu</a:t>
+            </a:r>
+          </a:p>
+          <a:p>
+            <a:r>
+              <a:rPr lang="fr-FR" b="1" smtClean="0"/>
+              <a:t>Créer un controlleur qui va récupérer toutes les parties stockées en base</a:t>
+            </a:r>
+          </a:p>
+          <a:p>
+            <a:r>
+              <a:rPr lang="fr-FR" b="1" smtClean="0"/>
+              <a:t>Créer un controlleur qui va récupérer les informations d’une partie spécifique en base</a:t>
+            </a:r>
+            <a:endParaRPr lang="fr-FR" b="1"/>
+          </a:p>
+        </p:txBody>
+      </p:sp>
+    </p:spTree>
+    <p:extLst>
+      <p:ext uri="{BB962C8B-B14F-4D97-AF65-F5344CB8AC3E}">
+        <p14:creationId xmlns:p14="http://schemas.microsoft.com/office/powerpoint/2010/main" val="1783206621"/>
+      </p:ext>
+    </p:extLst>
+  </p:cSld>
+  <p:clrMapOvr>
+    <a:masterClrMapping/>
+  </p:clrMapOvr>
+</p:sld>
+</file>
+
+<file path=ppt/slides/slide13.xml><?xml version="1.0" encoding="utf-8"?>
+<p:sld xmlns:a="http://schemas.openxmlformats.org/drawingml/2006/main" xmlns:r="http://schemas.openxmlformats.org/officeDocument/2006/relationships" xmlns:p="http://schemas.openxmlformats.org/presentationml/2006/main">
+  <p:cSld>
+    <p:spTree>
+      <p:nvGrpSpPr>
+        <p:cNvPr id="1" name=""/>
+        <p:cNvGrpSpPr/>
+        <p:nvPr/>
+      </p:nvGrpSpPr>
+      <p:grpSpPr>
+        <a:xfrm>
+          <a:off x="0" y="0"/>
+          <a:ext cx="0" cy="0"/>
+          <a:chOff x="0" y="0"/>
+          <a:chExt cx="0" cy="0"/>
+        </a:xfrm>
+      </p:grpSpPr>
+      <p:sp>
+        <p:nvSpPr>
+          <p:cNvPr id="2" name="Title 1"/>
+          <p:cNvSpPr>
+            <a:spLocks noGrp="1"/>
+          </p:cNvSpPr>
+          <p:nvPr>
+            <p:ph type="title"/>
+          </p:nvPr>
+        </p:nvSpPr>
+        <p:spPr/>
+        <p:txBody>
+          <a:bodyPr/>
+          <a:lstStyle/>
+          <a:p>
+            <a:r>
+              <a:rPr lang="fr-FR" smtClean="0"/>
               <a:t>Utiliser des classes de modèle spécifique	</a:t>
             </a:r>
             <a:endParaRPr lang="fr-FR"/>
@@ -13428,323 +13739,6 @@
 </p:sld>
 </file>
 
-<file path=ppt/slides/slide11.xml><?xml version="1.0" encoding="utf-8"?>
-<p:sld xmlns:a="http://schemas.openxmlformats.org/drawingml/2006/main" xmlns:r="http://schemas.openxmlformats.org/officeDocument/2006/relationships" xmlns:p="http://schemas.openxmlformats.org/presentationml/2006/main">
-  <p:cSld>
-    <p:spTree>
-      <p:nvGrpSpPr>
-        <p:cNvPr id="1" name=""/>
-        <p:cNvGrpSpPr/>
-        <p:nvPr/>
-      </p:nvGrpSpPr>
-      <p:grpSpPr>
-        <a:xfrm>
-          <a:off x="0" y="0"/>
-          <a:ext cx="0" cy="0"/>
-          <a:chOff x="0" y="0"/>
-          <a:chExt cx="0" cy="0"/>
-        </a:xfrm>
-      </p:grpSpPr>
-      <p:sp>
-        <p:nvSpPr>
-          <p:cNvPr id="2" name="Title 1"/>
-          <p:cNvSpPr>
-            <a:spLocks noGrp="1"/>
-          </p:cNvSpPr>
-          <p:nvPr>
-            <p:ph type="title"/>
-          </p:nvPr>
-        </p:nvSpPr>
-        <p:spPr/>
-        <p:txBody>
-          <a:bodyPr/>
-          <a:lstStyle/>
-          <a:p>
-            <a:r>
-              <a:rPr lang="fr-FR" smtClean="0"/>
-              <a:t>Routage : créer des urls Google Friendly</a:t>
-            </a:r>
-            <a:endParaRPr lang="fr-FR"/>
-          </a:p>
-        </p:txBody>
-      </p:sp>
-      <p:pic>
-        <p:nvPicPr>
-          <p:cNvPr id="4" name="Content Placeholder 3"/>
-          <p:cNvPicPr>
-            <a:picLocks noGrp="1" noChangeAspect="1"/>
-          </p:cNvPicPr>
-          <p:nvPr>
-            <p:ph idx="1"/>
-          </p:nvPr>
-        </p:nvPicPr>
-        <p:blipFill>
-          <a:blip r:embed="rId2"/>
-          <a:stretch>
-            <a:fillRect/>
-          </a:stretch>
-        </p:blipFill>
-        <p:spPr>
-          <a:xfrm>
-            <a:off x="1251234" y="3762056"/>
-            <a:ext cx="8824913" cy="2409371"/>
-          </a:xfrm>
-          <a:prstGeom prst="rect">
-            <a:avLst/>
-          </a:prstGeom>
-        </p:spPr>
-      </p:pic>
-      <p:sp>
-        <p:nvSpPr>
-          <p:cNvPr id="5" name="TextBox 4"/>
-          <p:cNvSpPr txBox="1"/>
-          <p:nvPr/>
-        </p:nvSpPr>
-        <p:spPr>
-          <a:xfrm>
-            <a:off x="1419367" y="2729552"/>
-            <a:ext cx="5715026" cy="400110"/>
-          </a:xfrm>
-          <a:prstGeom prst="rect">
-            <a:avLst/>
-          </a:prstGeom>
-          <a:noFill/>
-        </p:spPr>
-        <p:txBody>
-          <a:bodyPr wrap="none" rtlCol="0">
-            <a:spAutoFit/>
-          </a:bodyPr>
-          <a:lstStyle/>
-          <a:p>
-            <a:r>
-              <a:rPr lang="fr-FR" sz="2000" smtClean="0"/>
-              <a:t>Ajout de routes dans le fichier RouteConfig : </a:t>
-            </a:r>
-            <a:endParaRPr lang="fr-FR" sz="2000"/>
-          </a:p>
-        </p:txBody>
-      </p:sp>
-    </p:spTree>
-    <p:extLst>
-      <p:ext uri="{BB962C8B-B14F-4D97-AF65-F5344CB8AC3E}">
-        <p14:creationId xmlns:p14="http://schemas.microsoft.com/office/powerpoint/2010/main" val="1294180230"/>
-      </p:ext>
-    </p:extLst>
-  </p:cSld>
-  <p:clrMapOvr>
-    <a:masterClrMapping/>
-  </p:clrMapOvr>
-</p:sld>
-</file>
-
-<file path=ppt/slides/slide12.xml><?xml version="1.0" encoding="utf-8"?>
-<p:sld xmlns:a="http://schemas.openxmlformats.org/drawingml/2006/main" xmlns:r="http://schemas.openxmlformats.org/officeDocument/2006/relationships" xmlns:p="http://schemas.openxmlformats.org/presentationml/2006/main">
-  <p:cSld>
-    <p:spTree>
-      <p:nvGrpSpPr>
-        <p:cNvPr id="1" name=""/>
-        <p:cNvGrpSpPr/>
-        <p:nvPr/>
-      </p:nvGrpSpPr>
-      <p:grpSpPr>
-        <a:xfrm>
-          <a:off x="0" y="0"/>
-          <a:ext cx="0" cy="0"/>
-          <a:chOff x="0" y="0"/>
-          <a:chExt cx="0" cy="0"/>
-        </a:xfrm>
-      </p:grpSpPr>
-      <p:sp>
-        <p:nvSpPr>
-          <p:cNvPr id="2" name="Title 1"/>
-          <p:cNvSpPr>
-            <a:spLocks noGrp="1"/>
-          </p:cNvSpPr>
-          <p:nvPr>
-            <p:ph type="title"/>
-          </p:nvPr>
-        </p:nvSpPr>
-        <p:spPr/>
-        <p:txBody>
-          <a:bodyPr/>
-          <a:lstStyle/>
-          <a:p>
-            <a:r>
-              <a:rPr lang="fr-FR" smtClean="0"/>
-              <a:t>Exercice : Créer une API avec les verbes suivants</a:t>
-            </a:r>
-            <a:endParaRPr lang="fr-FR"/>
-          </a:p>
-        </p:txBody>
-      </p:sp>
-      <p:sp>
-        <p:nvSpPr>
-          <p:cNvPr id="3" name="Content Placeholder 2"/>
-          <p:cNvSpPr>
-            <a:spLocks noGrp="1"/>
-          </p:cNvSpPr>
-          <p:nvPr>
-            <p:ph idx="1"/>
-          </p:nvPr>
-        </p:nvSpPr>
-        <p:spPr/>
-        <p:txBody>
-          <a:bodyPr/>
-          <a:lstStyle/>
-          <a:p>
-            <a:r>
-              <a:rPr lang="fr-FR" smtClean="0"/>
-              <a:t>GET /api/customer : Récupère la liste de tous les customers</a:t>
-            </a:r>
-          </a:p>
-          <a:p>
-            <a:r>
-              <a:rPr lang="fr-FR"/>
-              <a:t>GET </a:t>
-            </a:r>
-            <a:r>
-              <a:rPr lang="fr-FR"/>
-              <a:t>/</a:t>
-            </a:r>
-            <a:r>
-              <a:rPr lang="fr-FR" smtClean="0"/>
-              <a:t>api/customer/BLONP : Récupère des informations sur BLONP</a:t>
-            </a:r>
-          </a:p>
-          <a:p>
-            <a:r>
-              <a:rPr lang="fr-FR"/>
-              <a:t>GET </a:t>
-            </a:r>
-            <a:r>
-              <a:rPr lang="fr-FR"/>
-              <a:t>/</a:t>
-            </a:r>
-            <a:r>
-              <a:rPr lang="fr-FR" smtClean="0"/>
-              <a:t>api/customer/BLONP/orders : Récupère toutes les commandes de l’utilsiateur BLONP</a:t>
-            </a:r>
-          </a:p>
-          <a:p>
-            <a:r>
-              <a:rPr lang="fr-FR"/>
-              <a:t>GET </a:t>
-            </a:r>
-            <a:r>
-              <a:rPr lang="fr-FR"/>
-              <a:t>/</a:t>
-            </a:r>
-            <a:r>
-              <a:rPr lang="fr-FR" smtClean="0"/>
-              <a:t>api/customer/BLONP/orders/10265 : récupérère une commande spécifique de l’utilisateur, rien du tout si ce n’est pas uen commande à lui</a:t>
-            </a:r>
-            <a:endParaRPr lang="fr-FR"/>
-          </a:p>
-          <a:p>
-            <a:endParaRPr lang="fr-FR"/>
-          </a:p>
-          <a:p>
-            <a:endParaRPr lang="fr-FR" smtClean="0"/>
-          </a:p>
-          <a:p>
-            <a:endParaRPr lang="fr-FR"/>
-          </a:p>
-          <a:p>
-            <a:endParaRPr lang="fr-FR"/>
-          </a:p>
-        </p:txBody>
-      </p:sp>
-    </p:spTree>
-    <p:extLst>
-      <p:ext uri="{BB962C8B-B14F-4D97-AF65-F5344CB8AC3E}">
-        <p14:creationId xmlns:p14="http://schemas.microsoft.com/office/powerpoint/2010/main" val="4179305986"/>
-      </p:ext>
-    </p:extLst>
-  </p:cSld>
-  <p:clrMapOvr>
-    <a:masterClrMapping/>
-  </p:clrMapOvr>
-</p:sld>
-</file>
-
-<file path=ppt/slides/slide13.xml><?xml version="1.0" encoding="utf-8"?>
-<p:sld xmlns:a="http://schemas.openxmlformats.org/drawingml/2006/main" xmlns:r="http://schemas.openxmlformats.org/officeDocument/2006/relationships" xmlns:p="http://schemas.openxmlformats.org/presentationml/2006/main">
-  <p:cSld>
-    <p:spTree>
-      <p:nvGrpSpPr>
-        <p:cNvPr id="1" name=""/>
-        <p:cNvGrpSpPr/>
-        <p:nvPr/>
-      </p:nvGrpSpPr>
-      <p:grpSpPr>
-        <a:xfrm>
-          <a:off x="0" y="0"/>
-          <a:ext cx="0" cy="0"/>
-          <a:chOff x="0" y="0"/>
-          <a:chExt cx="0" cy="0"/>
-        </a:xfrm>
-      </p:grpSpPr>
-      <p:sp>
-        <p:nvSpPr>
-          <p:cNvPr id="2" name="Title 1"/>
-          <p:cNvSpPr>
-            <a:spLocks noGrp="1"/>
-          </p:cNvSpPr>
-          <p:nvPr>
-            <p:ph type="title"/>
-          </p:nvPr>
-        </p:nvSpPr>
-        <p:spPr/>
-        <p:txBody>
-          <a:bodyPr/>
-          <a:lstStyle/>
-          <a:p>
-            <a:r>
-              <a:rPr lang="fr-FR" smtClean="0"/>
-              <a:t>Sécurité</a:t>
-            </a:r>
-            <a:endParaRPr lang="fr-FR"/>
-          </a:p>
-        </p:txBody>
-      </p:sp>
-      <p:sp>
-        <p:nvSpPr>
-          <p:cNvPr id="3" name="Content Placeholder 2"/>
-          <p:cNvSpPr>
-            <a:spLocks noGrp="1"/>
-          </p:cNvSpPr>
-          <p:nvPr>
-            <p:ph idx="1"/>
-          </p:nvPr>
-        </p:nvSpPr>
-        <p:spPr/>
-        <p:txBody>
-          <a:bodyPr/>
-          <a:lstStyle/>
-          <a:p>
-            <a:r>
-              <a:rPr lang="fr-FR" sz="2000" smtClean="0"/>
-              <a:t>Comment autoriser l’accès à la ressourceà certains utilisateurs seulement ?</a:t>
-            </a:r>
-          </a:p>
-          <a:p>
-            <a:endParaRPr lang="fr-FR"/>
-          </a:p>
-        </p:txBody>
-      </p:sp>
-    </p:spTree>
-    <p:extLst>
-      <p:ext uri="{BB962C8B-B14F-4D97-AF65-F5344CB8AC3E}">
-        <p14:creationId xmlns:p14="http://schemas.microsoft.com/office/powerpoint/2010/main" val="4127882415"/>
-      </p:ext>
-    </p:extLst>
-  </p:cSld>
-  <p:clrMapOvr>
-    <a:masterClrMapping/>
-  </p:clrMapOvr>
-</p:sld>
-</file>
-
 <file path=ppt/slides/slide14.xml><?xml version="1.0" encoding="utf-8"?>
 <p:sld xmlns:a="http://schemas.openxmlformats.org/drawingml/2006/main" xmlns:r="http://schemas.openxmlformats.org/officeDocument/2006/relationships" xmlns:p="http://schemas.openxmlformats.org/presentationml/2006/main">
   <p:cSld>
@@ -13779,7 +13773,488 @@
           <a:p>
             <a:r>
               <a:rPr lang="fr-FR" smtClean="0"/>
-              <a:t>Implementing POST </a:t>
+              <a:t>Comment fonctionne le routage ?</a:t>
+            </a:r>
+            <a:endParaRPr lang="fr-FR"/>
+          </a:p>
+        </p:txBody>
+      </p:sp>
+      <p:sp>
+        <p:nvSpPr>
+          <p:cNvPr id="4" name="Rectangle 3"/>
+          <p:cNvSpPr/>
+          <p:nvPr/>
+        </p:nvSpPr>
+        <p:spPr>
+          <a:xfrm>
+            <a:off x="7147249" y="3331029"/>
+            <a:ext cx="2136710" cy="1231641"/>
+          </a:xfrm>
+          <a:prstGeom prst="rect">
+            <a:avLst/>
+          </a:prstGeom>
+        </p:spPr>
+        <p:style>
+          <a:lnRef idx="2">
+            <a:schemeClr val="accent1">
+              <a:shade val="50000"/>
+            </a:schemeClr>
+          </a:lnRef>
+          <a:fillRef idx="1">
+            <a:schemeClr val="accent1"/>
+          </a:fillRef>
+          <a:effectRef idx="0">
+            <a:schemeClr val="accent1"/>
+          </a:effectRef>
+          <a:fontRef idx="minor">
+            <a:schemeClr val="lt1"/>
+          </a:fontRef>
+        </p:style>
+        <p:txBody>
+          <a:bodyPr rtlCol="0" anchor="ctr"/>
+          <a:lstStyle/>
+          <a:p>
+            <a:pPr algn="ctr"/>
+            <a:r>
+              <a:rPr lang="fr-FR" smtClean="0"/>
+              <a:t>Controlleur</a:t>
+            </a:r>
+            <a:endParaRPr lang="fr-FR"/>
+          </a:p>
+        </p:txBody>
+      </p:sp>
+      <p:sp>
+        <p:nvSpPr>
+          <p:cNvPr id="5" name="Rectangle 4"/>
+          <p:cNvSpPr/>
+          <p:nvPr/>
+        </p:nvSpPr>
+        <p:spPr>
+          <a:xfrm>
+            <a:off x="3296816" y="3331029"/>
+            <a:ext cx="2136710" cy="1231641"/>
+          </a:xfrm>
+          <a:prstGeom prst="rect">
+            <a:avLst/>
+          </a:prstGeom>
+        </p:spPr>
+        <p:style>
+          <a:lnRef idx="2">
+            <a:schemeClr val="accent1">
+              <a:shade val="50000"/>
+            </a:schemeClr>
+          </a:lnRef>
+          <a:fillRef idx="1">
+            <a:schemeClr val="accent1"/>
+          </a:fillRef>
+          <a:effectRef idx="0">
+            <a:schemeClr val="accent1"/>
+          </a:effectRef>
+          <a:fontRef idx="minor">
+            <a:schemeClr val="lt1"/>
+          </a:fontRef>
+        </p:style>
+        <p:txBody>
+          <a:bodyPr rtlCol="0" anchor="ctr"/>
+          <a:lstStyle/>
+          <a:p>
+            <a:pPr algn="ctr"/>
+            <a:r>
+              <a:rPr lang="fr-FR" smtClean="0"/>
+              <a:t>Module de routage</a:t>
+            </a:r>
+            <a:endParaRPr lang="fr-FR"/>
+          </a:p>
+        </p:txBody>
+      </p:sp>
+      <p:cxnSp>
+        <p:nvCxnSpPr>
+          <p:cNvPr id="7" name="Straight Arrow Connector 6"/>
+          <p:cNvCxnSpPr/>
+          <p:nvPr/>
+        </p:nvCxnSpPr>
+        <p:spPr>
+          <a:xfrm>
+            <a:off x="970384" y="3937518"/>
+            <a:ext cx="2326432" cy="0"/>
+          </a:xfrm>
+          <a:prstGeom prst="straightConnector1">
+            <a:avLst/>
+          </a:prstGeom>
+          <a:ln>
+            <a:tailEnd type="triangle"/>
+          </a:ln>
+        </p:spPr>
+        <p:style>
+          <a:lnRef idx="1">
+            <a:schemeClr val="accent1"/>
+          </a:lnRef>
+          <a:fillRef idx="0">
+            <a:schemeClr val="accent1"/>
+          </a:fillRef>
+          <a:effectRef idx="0">
+            <a:schemeClr val="accent1"/>
+          </a:effectRef>
+          <a:fontRef idx="minor">
+            <a:schemeClr val="tx1"/>
+          </a:fontRef>
+        </p:style>
+      </p:cxnSp>
+      <p:sp>
+        <p:nvSpPr>
+          <p:cNvPr id="8" name="TextBox 7"/>
+          <p:cNvSpPr txBox="1"/>
+          <p:nvPr/>
+        </p:nvSpPr>
+        <p:spPr>
+          <a:xfrm>
+            <a:off x="595118" y="2943035"/>
+            <a:ext cx="3182281" cy="369332"/>
+          </a:xfrm>
+          <a:prstGeom prst="rect">
+            <a:avLst/>
+          </a:prstGeom>
+          <a:noFill/>
+        </p:spPr>
+        <p:txBody>
+          <a:bodyPr wrap="none" rtlCol="0">
+            <a:spAutoFit/>
+          </a:bodyPr>
+          <a:lstStyle/>
+          <a:p>
+            <a:r>
+              <a:rPr lang="fr-FR" smtClean="0"/>
+              <a:t>http://toto.com/api/Home</a:t>
+            </a:r>
+            <a:endParaRPr lang="fr-FR"/>
+          </a:p>
+        </p:txBody>
+      </p:sp>
+      <p:cxnSp>
+        <p:nvCxnSpPr>
+          <p:cNvPr id="10" name="Straight Arrow Connector 9"/>
+          <p:cNvCxnSpPr>
+            <a:stCxn id="4" idx="3"/>
+          </p:cNvCxnSpPr>
+          <p:nvPr/>
+        </p:nvCxnSpPr>
+        <p:spPr>
+          <a:xfrm flipV="1">
+            <a:off x="9283959" y="3946849"/>
+            <a:ext cx="1380931" cy="1"/>
+          </a:xfrm>
+          <a:prstGeom prst="straightConnector1">
+            <a:avLst/>
+          </a:prstGeom>
+          <a:ln>
+            <a:tailEnd type="triangle"/>
+          </a:ln>
+        </p:spPr>
+        <p:style>
+          <a:lnRef idx="1">
+            <a:schemeClr val="accent1"/>
+          </a:lnRef>
+          <a:fillRef idx="0">
+            <a:schemeClr val="accent1"/>
+          </a:fillRef>
+          <a:effectRef idx="0">
+            <a:schemeClr val="accent1"/>
+          </a:effectRef>
+          <a:fontRef idx="minor">
+            <a:schemeClr val="tx1"/>
+          </a:fontRef>
+        </p:style>
+      </p:cxnSp>
+      <p:cxnSp>
+        <p:nvCxnSpPr>
+          <p:cNvPr id="12" name="Straight Arrow Connector 11"/>
+          <p:cNvCxnSpPr>
+            <a:stCxn id="5" idx="3"/>
+            <a:endCxn id="4" idx="1"/>
+          </p:cNvCxnSpPr>
+          <p:nvPr/>
+        </p:nvCxnSpPr>
+        <p:spPr>
+          <a:xfrm>
+            <a:off x="5433526" y="3946850"/>
+            <a:ext cx="1713723" cy="0"/>
+          </a:xfrm>
+          <a:prstGeom prst="straightConnector1">
+            <a:avLst/>
+          </a:prstGeom>
+          <a:ln>
+            <a:tailEnd type="triangle"/>
+          </a:ln>
+        </p:spPr>
+        <p:style>
+          <a:lnRef idx="1">
+            <a:schemeClr val="accent1"/>
+          </a:lnRef>
+          <a:fillRef idx="0">
+            <a:schemeClr val="accent1"/>
+          </a:fillRef>
+          <a:effectRef idx="0">
+            <a:schemeClr val="accent1"/>
+          </a:effectRef>
+          <a:fontRef idx="minor">
+            <a:schemeClr val="tx1"/>
+          </a:fontRef>
+        </p:style>
+      </p:cxnSp>
+      <p:sp>
+        <p:nvSpPr>
+          <p:cNvPr id="13" name="TextBox 12"/>
+          <p:cNvSpPr txBox="1"/>
+          <p:nvPr/>
+        </p:nvSpPr>
+        <p:spPr>
+          <a:xfrm>
+            <a:off x="5433526" y="2666036"/>
+            <a:ext cx="2358338" cy="646331"/>
+          </a:xfrm>
+          <a:prstGeom prst="rect">
+            <a:avLst/>
+          </a:prstGeom>
+          <a:noFill/>
+        </p:spPr>
+        <p:txBody>
+          <a:bodyPr wrap="none" rtlCol="0">
+            <a:spAutoFit/>
+          </a:bodyPr>
+          <a:lstStyle/>
+          <a:p>
+            <a:r>
+              <a:rPr lang="fr-FR" smtClean="0"/>
+              <a:t>Controlleur = Home</a:t>
+            </a:r>
+          </a:p>
+          <a:p>
+            <a:r>
+              <a:rPr lang="fr-FR" smtClean="0"/>
+              <a:t>Action = Get</a:t>
+            </a:r>
+            <a:endParaRPr lang="fr-FR"/>
+          </a:p>
+        </p:txBody>
+      </p:sp>
+      <p:sp>
+        <p:nvSpPr>
+          <p:cNvPr id="14" name="TextBox 13"/>
+          <p:cNvSpPr txBox="1"/>
+          <p:nvPr/>
+        </p:nvSpPr>
+        <p:spPr>
+          <a:xfrm>
+            <a:off x="595118" y="4972094"/>
+            <a:ext cx="10340360" cy="646331"/>
+          </a:xfrm>
+          <a:prstGeom prst="rect">
+            <a:avLst/>
+          </a:prstGeom>
+          <a:noFill/>
+        </p:spPr>
+        <p:txBody>
+          <a:bodyPr wrap="square" rtlCol="0">
+            <a:spAutoFit/>
+          </a:bodyPr>
+          <a:lstStyle/>
+          <a:p>
+            <a:r>
+              <a:rPr lang="fr-FR" b="1" smtClean="0"/>
+              <a:t>Le module de routage est responsable de trouver le controlleur et l’action que l’on doit appeler pour une url donnée</a:t>
+            </a:r>
+            <a:endParaRPr lang="fr-FR" b="1"/>
+          </a:p>
+        </p:txBody>
+      </p:sp>
+      <p:cxnSp>
+        <p:nvCxnSpPr>
+          <p:cNvPr id="16" name="Straight Arrow Connector 15"/>
+          <p:cNvCxnSpPr/>
+          <p:nvPr/>
+        </p:nvCxnSpPr>
+        <p:spPr>
+          <a:xfrm flipV="1">
+            <a:off x="8481527" y="2666036"/>
+            <a:ext cx="9330" cy="646332"/>
+          </a:xfrm>
+          <a:prstGeom prst="straightConnector1">
+            <a:avLst/>
+          </a:prstGeom>
+          <a:ln>
+            <a:tailEnd type="triangle"/>
+          </a:ln>
+        </p:spPr>
+        <p:style>
+          <a:lnRef idx="1">
+            <a:schemeClr val="accent1"/>
+          </a:lnRef>
+          <a:fillRef idx="0">
+            <a:schemeClr val="accent1"/>
+          </a:fillRef>
+          <a:effectRef idx="0">
+            <a:schemeClr val="accent1"/>
+          </a:effectRef>
+          <a:fontRef idx="minor">
+            <a:schemeClr val="tx1"/>
+          </a:fontRef>
+        </p:style>
+      </p:cxnSp>
+      <p:cxnSp>
+        <p:nvCxnSpPr>
+          <p:cNvPr id="18" name="Straight Arrow Connector 17"/>
+          <p:cNvCxnSpPr/>
+          <p:nvPr/>
+        </p:nvCxnSpPr>
+        <p:spPr>
+          <a:xfrm>
+            <a:off x="8733453" y="2705875"/>
+            <a:ext cx="9331" cy="615823"/>
+          </a:xfrm>
+          <a:prstGeom prst="straightConnector1">
+            <a:avLst/>
+          </a:prstGeom>
+          <a:ln>
+            <a:tailEnd type="triangle"/>
+          </a:ln>
+        </p:spPr>
+        <p:style>
+          <a:lnRef idx="1">
+            <a:schemeClr val="accent1"/>
+          </a:lnRef>
+          <a:fillRef idx="0">
+            <a:schemeClr val="accent1"/>
+          </a:fillRef>
+          <a:effectRef idx="0">
+            <a:schemeClr val="accent1"/>
+          </a:effectRef>
+          <a:fontRef idx="minor">
+            <a:schemeClr val="tx1"/>
+          </a:fontRef>
+        </p:style>
+      </p:cxnSp>
+      <p:sp>
+        <p:nvSpPr>
+          <p:cNvPr id="20" name="Rectangle 19"/>
+          <p:cNvSpPr/>
+          <p:nvPr/>
+        </p:nvSpPr>
+        <p:spPr>
+          <a:xfrm>
+            <a:off x="7791864" y="1680632"/>
+            <a:ext cx="1604063" cy="894617"/>
+          </a:xfrm>
+          <a:prstGeom prst="rect">
+            <a:avLst/>
+          </a:prstGeom>
+        </p:spPr>
+        <p:style>
+          <a:lnRef idx="2">
+            <a:schemeClr val="accent1">
+              <a:shade val="50000"/>
+            </a:schemeClr>
+          </a:lnRef>
+          <a:fillRef idx="1">
+            <a:schemeClr val="accent1"/>
+          </a:fillRef>
+          <a:effectRef idx="0">
+            <a:schemeClr val="accent1"/>
+          </a:effectRef>
+          <a:fontRef idx="minor">
+            <a:schemeClr val="lt1"/>
+          </a:fontRef>
+        </p:style>
+        <p:txBody>
+          <a:bodyPr rtlCol="0" anchor="ctr"/>
+          <a:lstStyle/>
+          <a:p>
+            <a:pPr algn="ctr"/>
+            <a:r>
+              <a:rPr lang="fr-FR" smtClean="0"/>
+              <a:t>Modele</a:t>
+            </a:r>
+            <a:endParaRPr lang="fr-FR"/>
+          </a:p>
+        </p:txBody>
+      </p:sp>
+      <p:sp>
+        <p:nvSpPr>
+          <p:cNvPr id="21" name="TextBox 20"/>
+          <p:cNvSpPr txBox="1"/>
+          <p:nvPr/>
+        </p:nvSpPr>
+        <p:spPr>
+          <a:xfrm>
+            <a:off x="9395927" y="3557471"/>
+            <a:ext cx="2185214" cy="369332"/>
+          </a:xfrm>
+          <a:prstGeom prst="rect">
+            <a:avLst/>
+          </a:prstGeom>
+          <a:noFill/>
+        </p:spPr>
+        <p:txBody>
+          <a:bodyPr wrap="none" rtlCol="0">
+            <a:spAutoFit/>
+          </a:bodyPr>
+          <a:lstStyle/>
+          <a:p>
+            <a:r>
+              <a:rPr lang="fr-FR" smtClean="0"/>
+              <a:t>Données en sortie</a:t>
+            </a:r>
+            <a:endParaRPr lang="fr-FR"/>
+          </a:p>
+        </p:txBody>
+      </p:sp>
+    </p:spTree>
+    <p:extLst>
+      <p:ext uri="{BB962C8B-B14F-4D97-AF65-F5344CB8AC3E}">
+        <p14:creationId xmlns:p14="http://schemas.microsoft.com/office/powerpoint/2010/main" val="1536139069"/>
+      </p:ext>
+    </p:extLst>
+  </p:cSld>
+  <p:clrMapOvr>
+    <a:masterClrMapping/>
+  </p:clrMapOvr>
+</p:sld>
+</file>
+
+<file path=ppt/slides/slide15.xml><?xml version="1.0" encoding="utf-8"?>
+<p:sld xmlns:a="http://schemas.openxmlformats.org/drawingml/2006/main" xmlns:r="http://schemas.openxmlformats.org/officeDocument/2006/relationships" xmlns:p="http://schemas.openxmlformats.org/presentationml/2006/main">
+  <p:cSld>
+    <p:spTree>
+      <p:nvGrpSpPr>
+        <p:cNvPr id="1" name=""/>
+        <p:cNvGrpSpPr/>
+        <p:nvPr/>
+      </p:nvGrpSpPr>
+      <p:grpSpPr>
+        <a:xfrm>
+          <a:off x="0" y="0"/>
+          <a:ext cx="0" cy="0"/>
+          <a:chOff x="0" y="0"/>
+          <a:chExt cx="0" cy="0"/>
+        </a:xfrm>
+      </p:grpSpPr>
+      <p:sp>
+        <p:nvSpPr>
+          <p:cNvPr id="2" name="Title 1"/>
+          <p:cNvSpPr>
+            <a:spLocks noGrp="1"/>
+          </p:cNvSpPr>
+          <p:nvPr>
+            <p:ph type="title"/>
+          </p:nvPr>
+        </p:nvSpPr>
+        <p:spPr/>
+        <p:txBody>
+          <a:bodyPr/>
+          <a:lstStyle/>
+          <a:p>
+            <a:r>
+              <a:rPr lang="fr-FR" smtClean="0"/>
+              <a:t>Intérêt du module de routage</a:t>
             </a:r>
             <a:endParaRPr lang="fr-FR"/>
           </a:p>
@@ -13800,14 +14275,518 @@
           <a:bodyPr/>
           <a:lstStyle/>
           <a:p>
-            <a:endParaRPr lang="fr-FR"/>
+            <a:r>
+              <a:rPr lang="fr-FR" b="1" smtClean="0"/>
+              <a:t>Pouvoir créerdes urls personnalisées qui diffèrent de la route par défaut :</a:t>
+            </a:r>
+          </a:p>
+          <a:p>
+            <a:r>
+              <a:rPr lang="fr-FR" b="1" smtClean="0">
+                <a:hlinkClick r:id="rId2"/>
+              </a:rPr>
+              <a:t>http://nomdedomaine/api/controlleur/</a:t>
+            </a:r>
+            <a:endParaRPr lang="fr-FR" b="1"/>
+          </a:p>
+          <a:p>
+            <a:r>
+              <a:rPr lang="fr-FR" smtClean="0"/>
+              <a:t>Ex : </a:t>
+            </a:r>
+            <a:r>
+              <a:rPr lang="fr-FR" smtClean="0">
+                <a:hlinkClick r:id="rId3"/>
+              </a:rPr>
+              <a:t>http://toto.com/api/parties</a:t>
+            </a:r>
+            <a:r>
+              <a:rPr lang="fr-FR" smtClean="0"/>
+              <a:t> à la place de </a:t>
+            </a:r>
+            <a:r>
+              <a:rPr lang="fr-FR" smtClean="0">
+                <a:hlinkClick r:id="rId4"/>
+              </a:rPr>
+              <a:t>http://toto.com/api/PartiePendu</a:t>
+            </a:r>
+            <a:r>
+              <a:rPr lang="fr-FR" smtClean="0"/>
+              <a:t>  ( si mon controller s’appelle PartiePendu)</a:t>
+            </a:r>
           </a:p>
         </p:txBody>
       </p:sp>
     </p:spTree>
     <p:extLst>
       <p:ext uri="{BB962C8B-B14F-4D97-AF65-F5344CB8AC3E}">
-        <p14:creationId xmlns:p14="http://schemas.microsoft.com/office/powerpoint/2010/main" val="2051450129"/>
+        <p14:creationId xmlns:p14="http://schemas.microsoft.com/office/powerpoint/2010/main" val="596830224"/>
+      </p:ext>
+    </p:extLst>
+  </p:cSld>
+  <p:clrMapOvr>
+    <a:masterClrMapping/>
+  </p:clrMapOvr>
+</p:sld>
+</file>
+
+<file path=ppt/slides/slide16.xml><?xml version="1.0" encoding="utf-8"?>
+<p:sld xmlns:a="http://schemas.openxmlformats.org/drawingml/2006/main" xmlns:r="http://schemas.openxmlformats.org/officeDocument/2006/relationships" xmlns:p="http://schemas.openxmlformats.org/presentationml/2006/main">
+  <p:cSld>
+    <p:spTree>
+      <p:nvGrpSpPr>
+        <p:cNvPr id="1" name=""/>
+        <p:cNvGrpSpPr/>
+        <p:nvPr/>
+      </p:nvGrpSpPr>
+      <p:grpSpPr>
+        <a:xfrm>
+          <a:off x="0" y="0"/>
+          <a:ext cx="0" cy="0"/>
+          <a:chOff x="0" y="0"/>
+          <a:chExt cx="0" cy="0"/>
+        </a:xfrm>
+      </p:grpSpPr>
+      <p:sp>
+        <p:nvSpPr>
+          <p:cNvPr id="2" name="Title 1"/>
+          <p:cNvSpPr>
+            <a:spLocks noGrp="1"/>
+          </p:cNvSpPr>
+          <p:nvPr>
+            <p:ph type="title"/>
+          </p:nvPr>
+        </p:nvSpPr>
+        <p:spPr/>
+        <p:txBody>
+          <a:bodyPr/>
+          <a:lstStyle/>
+          <a:p>
+            <a:r>
+              <a:rPr lang="fr-FR" smtClean="0"/>
+              <a:t>Routage : créer des urls Google Friendly</a:t>
+            </a:r>
+            <a:endParaRPr lang="fr-FR"/>
+          </a:p>
+        </p:txBody>
+      </p:sp>
+      <p:sp>
+        <p:nvSpPr>
+          <p:cNvPr id="5" name="TextBox 4"/>
+          <p:cNvSpPr txBox="1"/>
+          <p:nvPr/>
+        </p:nvSpPr>
+        <p:spPr>
+          <a:xfrm>
+            <a:off x="775554" y="2412311"/>
+            <a:ext cx="2770079" cy="1015663"/>
+          </a:xfrm>
+          <a:prstGeom prst="rect">
+            <a:avLst/>
+          </a:prstGeom>
+          <a:noFill/>
+        </p:spPr>
+        <p:txBody>
+          <a:bodyPr wrap="square" rtlCol="0">
+            <a:spAutoFit/>
+          </a:bodyPr>
+          <a:lstStyle/>
+          <a:p>
+            <a:r>
+              <a:rPr lang="fr-FR" sz="2000" smtClean="0"/>
+              <a:t>Ajout de routes dans le fichier </a:t>
+            </a:r>
+            <a:r>
+              <a:rPr lang="fr-FR" sz="2000" smtClean="0"/>
+              <a:t>WebApi</a:t>
+            </a:r>
+          </a:p>
+          <a:p>
+            <a:r>
+              <a:rPr lang="fr-FR" sz="2000" smtClean="0"/>
+              <a:t>Config </a:t>
+            </a:r>
+            <a:r>
+              <a:rPr lang="fr-FR" sz="2000" smtClean="0"/>
+              <a:t>: </a:t>
+            </a:r>
+            <a:endParaRPr lang="fr-FR" sz="2000"/>
+          </a:p>
+        </p:txBody>
+      </p:sp>
+      <p:pic>
+        <p:nvPicPr>
+          <p:cNvPr id="6" name="Picture 5"/>
+          <p:cNvPicPr>
+            <a:picLocks noChangeAspect="1"/>
+          </p:cNvPicPr>
+          <p:nvPr/>
+        </p:nvPicPr>
+        <p:blipFill>
+          <a:blip r:embed="rId2"/>
+          <a:stretch>
+            <a:fillRect/>
+          </a:stretch>
+        </p:blipFill>
+        <p:spPr>
+          <a:xfrm>
+            <a:off x="3952002" y="2215748"/>
+            <a:ext cx="7572375" cy="4210050"/>
+          </a:xfrm>
+          <a:prstGeom prst="rect">
+            <a:avLst/>
+          </a:prstGeom>
+        </p:spPr>
+      </p:pic>
+    </p:spTree>
+    <p:extLst>
+      <p:ext uri="{BB962C8B-B14F-4D97-AF65-F5344CB8AC3E}">
+        <p14:creationId xmlns:p14="http://schemas.microsoft.com/office/powerpoint/2010/main" val="1294180230"/>
+      </p:ext>
+    </p:extLst>
+  </p:cSld>
+  <p:clrMapOvr>
+    <a:masterClrMapping/>
+  </p:clrMapOvr>
+</p:sld>
+</file>
+
+<file path=ppt/slides/slide17.xml><?xml version="1.0" encoding="utf-8"?>
+<p:sld xmlns:a="http://schemas.openxmlformats.org/drawingml/2006/main" xmlns:r="http://schemas.openxmlformats.org/officeDocument/2006/relationships" xmlns:p="http://schemas.openxmlformats.org/presentationml/2006/main">
+  <p:cSld>
+    <p:spTree>
+      <p:nvGrpSpPr>
+        <p:cNvPr id="1" name=""/>
+        <p:cNvGrpSpPr/>
+        <p:nvPr/>
+      </p:nvGrpSpPr>
+      <p:grpSpPr>
+        <a:xfrm>
+          <a:off x="0" y="0"/>
+          <a:ext cx="0" cy="0"/>
+          <a:chOff x="0" y="0"/>
+          <a:chExt cx="0" cy="0"/>
+        </a:xfrm>
+      </p:grpSpPr>
+      <p:sp>
+        <p:nvSpPr>
+          <p:cNvPr id="2" name="Title 1"/>
+          <p:cNvSpPr>
+            <a:spLocks noGrp="1"/>
+          </p:cNvSpPr>
+          <p:nvPr>
+            <p:ph type="title"/>
+          </p:nvPr>
+        </p:nvSpPr>
+        <p:spPr/>
+        <p:txBody>
+          <a:bodyPr/>
+          <a:lstStyle/>
+          <a:p>
+            <a:r>
+              <a:rPr lang="fr-FR" smtClean="0"/>
+              <a:t>Exercice routage </a:t>
+            </a:r>
+            <a:endParaRPr lang="fr-FR"/>
+          </a:p>
+        </p:txBody>
+      </p:sp>
+      <p:sp>
+        <p:nvSpPr>
+          <p:cNvPr id="3" name="Content Placeholder 2"/>
+          <p:cNvSpPr>
+            <a:spLocks noGrp="1"/>
+          </p:cNvSpPr>
+          <p:nvPr>
+            <p:ph idx="1"/>
+          </p:nvPr>
+        </p:nvSpPr>
+        <p:spPr>
+          <a:xfrm>
+            <a:off x="1122830" y="2668814"/>
+            <a:ext cx="8825659" cy="3416300"/>
+          </a:xfrm>
+        </p:spPr>
+        <p:txBody>
+          <a:bodyPr/>
+          <a:lstStyle/>
+          <a:p>
+            <a:r>
+              <a:rPr lang="fr-FR" smtClean="0"/>
+              <a:t>Changer l’url par défaut de votre controlleur ( /api/NomDuController) en</a:t>
+            </a:r>
+          </a:p>
+          <a:p>
+            <a:pPr marL="0" indent="0">
+              <a:buNone/>
+            </a:pPr>
+            <a:r>
+              <a:rPr lang="fr-FR" smtClean="0"/>
+              <a:t>/api/parties</a:t>
+            </a:r>
+            <a:endParaRPr lang="fr-FR"/>
+          </a:p>
+        </p:txBody>
+      </p:sp>
+    </p:spTree>
+    <p:extLst>
+      <p:ext uri="{BB962C8B-B14F-4D97-AF65-F5344CB8AC3E}">
+        <p14:creationId xmlns:p14="http://schemas.microsoft.com/office/powerpoint/2010/main" val="1200763291"/>
+      </p:ext>
+    </p:extLst>
+  </p:cSld>
+  <p:clrMapOvr>
+    <a:masterClrMapping/>
+  </p:clrMapOvr>
+</p:sld>
+</file>
+
+<file path=ppt/slides/slide18.xml><?xml version="1.0" encoding="utf-8"?>
+<p:sld xmlns:a="http://schemas.openxmlformats.org/drawingml/2006/main" xmlns:r="http://schemas.openxmlformats.org/officeDocument/2006/relationships" xmlns:p="http://schemas.openxmlformats.org/presentationml/2006/main">
+  <p:cSld>
+    <p:spTree>
+      <p:nvGrpSpPr>
+        <p:cNvPr id="1" name=""/>
+        <p:cNvGrpSpPr/>
+        <p:nvPr/>
+      </p:nvGrpSpPr>
+      <p:grpSpPr>
+        <a:xfrm>
+          <a:off x="0" y="0"/>
+          <a:ext cx="0" cy="0"/>
+          <a:chOff x="0" y="0"/>
+          <a:chExt cx="0" cy="0"/>
+        </a:xfrm>
+      </p:grpSpPr>
+      <p:sp>
+        <p:nvSpPr>
+          <p:cNvPr id="2" name="Title 1"/>
+          <p:cNvSpPr>
+            <a:spLocks noGrp="1"/>
+          </p:cNvSpPr>
+          <p:nvPr>
+            <p:ph type="title"/>
+          </p:nvPr>
+        </p:nvSpPr>
+        <p:spPr/>
+        <p:txBody>
+          <a:bodyPr/>
+          <a:lstStyle/>
+          <a:p>
+            <a:r>
+              <a:rPr lang="fr-FR" smtClean="0"/>
+              <a:t>Exercice : Créer une API avec les verbes suivants</a:t>
+            </a:r>
+            <a:endParaRPr lang="fr-FR"/>
+          </a:p>
+        </p:txBody>
+      </p:sp>
+      <p:sp>
+        <p:nvSpPr>
+          <p:cNvPr id="3" name="Content Placeholder 2"/>
+          <p:cNvSpPr>
+            <a:spLocks noGrp="1"/>
+          </p:cNvSpPr>
+          <p:nvPr>
+            <p:ph idx="1"/>
+          </p:nvPr>
+        </p:nvSpPr>
+        <p:spPr/>
+        <p:txBody>
+          <a:bodyPr/>
+          <a:lstStyle/>
+          <a:p>
+            <a:r>
+              <a:rPr lang="fr-FR" smtClean="0"/>
+              <a:t>GET /api/customer : Récupère la liste de tous les customers</a:t>
+            </a:r>
+          </a:p>
+          <a:p>
+            <a:r>
+              <a:rPr lang="fr-FR"/>
+              <a:t>GET /</a:t>
+            </a:r>
+            <a:r>
+              <a:rPr lang="fr-FR" smtClean="0"/>
+              <a:t>api/customer/BLONP : Récupère des informations sur BLONP</a:t>
+            </a:r>
+          </a:p>
+          <a:p>
+            <a:r>
+              <a:rPr lang="fr-FR"/>
+              <a:t>GET /</a:t>
+            </a:r>
+            <a:r>
+              <a:rPr lang="fr-FR" smtClean="0"/>
+              <a:t>api/customer/BLONP/orders : Récupère toutes les commandes de l’utilsiateur BLONP</a:t>
+            </a:r>
+          </a:p>
+          <a:p>
+            <a:r>
+              <a:rPr lang="fr-FR"/>
+              <a:t>GET /</a:t>
+            </a:r>
+            <a:r>
+              <a:rPr lang="fr-FR" smtClean="0"/>
+              <a:t>api/customer/BLONP/orders/10265 : récupérère une commande spécifique de l’utilisateur, rien du tout si ce n’est pas uen commande à lui</a:t>
+            </a:r>
+            <a:endParaRPr lang="fr-FR"/>
+          </a:p>
+          <a:p>
+            <a:endParaRPr lang="fr-FR"/>
+          </a:p>
+          <a:p>
+            <a:endParaRPr lang="fr-FR" smtClean="0"/>
+          </a:p>
+          <a:p>
+            <a:endParaRPr lang="fr-FR"/>
+          </a:p>
+          <a:p>
+            <a:endParaRPr lang="fr-FR"/>
+          </a:p>
+        </p:txBody>
+      </p:sp>
+    </p:spTree>
+    <p:extLst>
+      <p:ext uri="{BB962C8B-B14F-4D97-AF65-F5344CB8AC3E}">
+        <p14:creationId xmlns:p14="http://schemas.microsoft.com/office/powerpoint/2010/main" val="4179305986"/>
+      </p:ext>
+    </p:extLst>
+  </p:cSld>
+  <p:clrMapOvr>
+    <a:masterClrMapping/>
+  </p:clrMapOvr>
+</p:sld>
+</file>
+
+<file path=ppt/slides/slide19.xml><?xml version="1.0" encoding="utf-8"?>
+<p:sld xmlns:a="http://schemas.openxmlformats.org/drawingml/2006/main" xmlns:r="http://schemas.openxmlformats.org/officeDocument/2006/relationships" xmlns:p="http://schemas.openxmlformats.org/presentationml/2006/main">
+  <p:cSld>
+    <p:spTree>
+      <p:nvGrpSpPr>
+        <p:cNvPr id="1" name=""/>
+        <p:cNvGrpSpPr/>
+        <p:nvPr/>
+      </p:nvGrpSpPr>
+      <p:grpSpPr>
+        <a:xfrm>
+          <a:off x="0" y="0"/>
+          <a:ext cx="0" cy="0"/>
+          <a:chOff x="0" y="0"/>
+          <a:chExt cx="0" cy="0"/>
+        </a:xfrm>
+      </p:grpSpPr>
+      <p:sp>
+        <p:nvSpPr>
+          <p:cNvPr id="2" name="Title 1"/>
+          <p:cNvSpPr>
+            <a:spLocks noGrp="1"/>
+          </p:cNvSpPr>
+          <p:nvPr>
+            <p:ph type="title"/>
+          </p:nvPr>
+        </p:nvSpPr>
+        <p:spPr/>
+        <p:txBody>
+          <a:bodyPr/>
+          <a:lstStyle/>
+          <a:p>
+            <a:r>
+              <a:rPr lang="fr-FR" smtClean="0"/>
+              <a:t>POST : pour insérer des données en base</a:t>
+            </a:r>
+            <a:endParaRPr lang="fr-FR"/>
+          </a:p>
+        </p:txBody>
+      </p:sp>
+      <p:sp>
+        <p:nvSpPr>
+          <p:cNvPr id="3" name="Content Placeholder 2"/>
+          <p:cNvSpPr>
+            <a:spLocks noGrp="1"/>
+          </p:cNvSpPr>
+          <p:nvPr>
+            <p:ph idx="1"/>
+          </p:nvPr>
+        </p:nvSpPr>
+        <p:spPr/>
+        <p:txBody>
+          <a:bodyPr/>
+          <a:lstStyle/>
+          <a:p>
+            <a:r>
+              <a:rPr lang="fr-FR" smtClean="0"/>
+              <a:t>Pour insérer une nouvelle ligne dans la table Customer on envoie un message POST</a:t>
+            </a:r>
+          </a:p>
+          <a:p>
+            <a:r>
+              <a:rPr lang="fr-FR" smtClean="0"/>
+              <a:t>Les données ContactName,CompanyName,CustomerId de notre Customer sont stockées dans le corps du message.</a:t>
+            </a:r>
+          </a:p>
+          <a:p>
+            <a:endParaRPr lang="fr-FR"/>
+          </a:p>
+          <a:p>
+            <a:r>
+              <a:rPr lang="fr-FR"/>
+              <a:t>Attention à ne pas oublier </a:t>
+            </a:r>
+            <a:r>
+              <a:rPr lang="fr-FR" i="1"/>
+              <a:t>Content-Type</a:t>
+            </a:r>
+            <a:r>
+              <a:rPr lang="fr-FR" i="1"/>
+              <a:t>: </a:t>
+            </a:r>
+            <a:r>
+              <a:rPr lang="fr-FR" i="1" smtClean="0"/>
+              <a:t>application/json </a:t>
+            </a:r>
+            <a:r>
+              <a:rPr lang="fr-FR" smtClean="0"/>
+              <a:t> dans l’entête du message !</a:t>
+            </a:r>
+          </a:p>
+          <a:p>
+            <a:r>
+              <a:rPr lang="fr-FR" smtClean="0"/>
+              <a:t>Démo avec Fiddler</a:t>
+            </a:r>
+            <a:endParaRPr lang="fr-FR"/>
+          </a:p>
+        </p:txBody>
+      </p:sp>
+      <p:pic>
+        <p:nvPicPr>
+          <p:cNvPr id="4" name="Picture 3"/>
+          <p:cNvPicPr>
+            <a:picLocks noChangeAspect="1"/>
+          </p:cNvPicPr>
+          <p:nvPr/>
+        </p:nvPicPr>
+        <p:blipFill>
+          <a:blip r:embed="rId2"/>
+          <a:stretch>
+            <a:fillRect/>
+          </a:stretch>
+        </p:blipFill>
+        <p:spPr>
+          <a:xfrm>
+            <a:off x="9144000" y="126352"/>
+            <a:ext cx="3048000" cy="2705100"/>
+          </a:xfrm>
+          <a:prstGeom prst="rect">
+            <a:avLst/>
+          </a:prstGeom>
+        </p:spPr>
+      </p:pic>
+    </p:spTree>
+    <p:extLst>
+      <p:ext uri="{BB962C8B-B14F-4D97-AF65-F5344CB8AC3E}">
+        <p14:creationId xmlns:p14="http://schemas.microsoft.com/office/powerpoint/2010/main" val="4020911005"/>
       </p:ext>
     </p:extLst>
   </p:cSld>
@@ -13851,6 +14830,1994 @@
           <a:p>
             <a:r>
               <a:rPr lang="fr-FR" smtClean="0"/>
+              <a:t>Schéma général de fonctionnement WebAPI</a:t>
+            </a:r>
+            <a:endParaRPr lang="fr-FR"/>
+          </a:p>
+        </p:txBody>
+      </p:sp>
+      <p:sp>
+        <p:nvSpPr>
+          <p:cNvPr id="4" name="Rectangle 3"/>
+          <p:cNvSpPr/>
+          <p:nvPr/>
+        </p:nvSpPr>
+        <p:spPr>
+          <a:xfrm>
+            <a:off x="4625928" y="2402631"/>
+            <a:ext cx="6913982" cy="4021493"/>
+          </a:xfrm>
+          <a:prstGeom prst="rect">
+            <a:avLst/>
+          </a:prstGeom>
+          <a:solidFill>
+            <a:schemeClr val="accent1">
+              <a:lumMod val="20000"/>
+              <a:lumOff val="80000"/>
+            </a:schemeClr>
+          </a:solidFill>
+        </p:spPr>
+        <p:style>
+          <a:lnRef idx="2">
+            <a:schemeClr val="accent1">
+              <a:shade val="50000"/>
+            </a:schemeClr>
+          </a:lnRef>
+          <a:fillRef idx="1">
+            <a:schemeClr val="accent1"/>
+          </a:fillRef>
+          <a:effectRef idx="0">
+            <a:schemeClr val="accent1"/>
+          </a:effectRef>
+          <a:fontRef idx="minor">
+            <a:schemeClr val="lt1"/>
+          </a:fontRef>
+        </p:style>
+        <p:txBody>
+          <a:bodyPr rtlCol="0" anchor="ctr"/>
+          <a:lstStyle/>
+          <a:p>
+            <a:pPr algn="ctr"/>
+            <a:endParaRPr lang="fr-FR" smtClean="0">
+              <a:solidFill>
+                <a:schemeClr val="bg2">
+                  <a:lumMod val="25000"/>
+                </a:schemeClr>
+              </a:solidFill>
+            </a:endParaRPr>
+          </a:p>
+          <a:p>
+            <a:pPr algn="ctr"/>
+            <a:endParaRPr lang="fr-FR">
+              <a:solidFill>
+                <a:schemeClr val="bg2">
+                  <a:lumMod val="25000"/>
+                </a:schemeClr>
+              </a:solidFill>
+            </a:endParaRPr>
+          </a:p>
+          <a:p>
+            <a:pPr algn="ctr"/>
+            <a:endParaRPr lang="fr-FR" smtClean="0">
+              <a:solidFill>
+                <a:schemeClr val="bg2">
+                  <a:lumMod val="25000"/>
+                </a:schemeClr>
+              </a:solidFill>
+            </a:endParaRPr>
+          </a:p>
+          <a:p>
+            <a:pPr algn="ctr"/>
+            <a:endParaRPr lang="fr-FR">
+              <a:solidFill>
+                <a:schemeClr val="bg2">
+                  <a:lumMod val="25000"/>
+                </a:schemeClr>
+              </a:solidFill>
+            </a:endParaRPr>
+          </a:p>
+          <a:p>
+            <a:pPr algn="ctr"/>
+            <a:endParaRPr lang="fr-FR" smtClean="0">
+              <a:solidFill>
+                <a:schemeClr val="bg2">
+                  <a:lumMod val="25000"/>
+                </a:schemeClr>
+              </a:solidFill>
+            </a:endParaRPr>
+          </a:p>
+          <a:p>
+            <a:pPr algn="ctr"/>
+            <a:endParaRPr lang="fr-FR">
+              <a:solidFill>
+                <a:schemeClr val="bg2">
+                  <a:lumMod val="25000"/>
+                </a:schemeClr>
+              </a:solidFill>
+            </a:endParaRPr>
+          </a:p>
+          <a:p>
+            <a:pPr algn="ctr"/>
+            <a:endParaRPr lang="fr-FR" smtClean="0">
+              <a:solidFill>
+                <a:schemeClr val="bg2">
+                  <a:lumMod val="25000"/>
+                </a:schemeClr>
+              </a:solidFill>
+            </a:endParaRPr>
+          </a:p>
+          <a:p>
+            <a:pPr algn="ctr"/>
+            <a:endParaRPr lang="fr-FR">
+              <a:solidFill>
+                <a:schemeClr val="bg2">
+                  <a:lumMod val="25000"/>
+                </a:schemeClr>
+              </a:solidFill>
+            </a:endParaRPr>
+          </a:p>
+          <a:p>
+            <a:pPr algn="ctr"/>
+            <a:endParaRPr lang="fr-FR" smtClean="0">
+              <a:solidFill>
+                <a:schemeClr val="bg2">
+                  <a:lumMod val="25000"/>
+                </a:schemeClr>
+              </a:solidFill>
+            </a:endParaRPr>
+          </a:p>
+          <a:p>
+            <a:pPr algn="ctr"/>
+            <a:endParaRPr lang="fr-FR">
+              <a:solidFill>
+                <a:schemeClr val="bg2">
+                  <a:lumMod val="25000"/>
+                </a:schemeClr>
+              </a:solidFill>
+            </a:endParaRPr>
+          </a:p>
+          <a:p>
+            <a:pPr algn="ctr"/>
+            <a:endParaRPr lang="fr-FR" smtClean="0">
+              <a:solidFill>
+                <a:schemeClr val="bg2">
+                  <a:lumMod val="25000"/>
+                </a:schemeClr>
+              </a:solidFill>
+            </a:endParaRPr>
+          </a:p>
+          <a:p>
+            <a:pPr algn="ctr"/>
+            <a:endParaRPr lang="fr-FR">
+              <a:solidFill>
+                <a:schemeClr val="bg2">
+                  <a:lumMod val="25000"/>
+                </a:schemeClr>
+              </a:solidFill>
+            </a:endParaRPr>
+          </a:p>
+          <a:p>
+            <a:pPr algn="ctr"/>
+            <a:r>
+              <a:rPr lang="fr-FR" smtClean="0">
+                <a:solidFill>
+                  <a:schemeClr val="bg2">
+                    <a:lumMod val="25000"/>
+                  </a:schemeClr>
+                </a:solidFill>
+              </a:rPr>
+              <a:t>Service</a:t>
+            </a:r>
+            <a:endParaRPr lang="fr-FR">
+              <a:solidFill>
+                <a:schemeClr val="bg2">
+                  <a:lumMod val="25000"/>
+                </a:schemeClr>
+              </a:solidFill>
+            </a:endParaRPr>
+          </a:p>
+        </p:txBody>
+      </p:sp>
+      <p:sp>
+        <p:nvSpPr>
+          <p:cNvPr id="5" name="Rectangle 4"/>
+          <p:cNvSpPr/>
+          <p:nvPr/>
+        </p:nvSpPr>
+        <p:spPr>
+          <a:xfrm>
+            <a:off x="8668139" y="3918858"/>
+            <a:ext cx="1688840" cy="1091681"/>
+          </a:xfrm>
+          <a:prstGeom prst="rect">
+            <a:avLst/>
+          </a:prstGeom>
+        </p:spPr>
+        <p:style>
+          <a:lnRef idx="2">
+            <a:schemeClr val="accent1">
+              <a:shade val="50000"/>
+            </a:schemeClr>
+          </a:lnRef>
+          <a:fillRef idx="1">
+            <a:schemeClr val="accent1"/>
+          </a:fillRef>
+          <a:effectRef idx="0">
+            <a:schemeClr val="accent1"/>
+          </a:effectRef>
+          <a:fontRef idx="minor">
+            <a:schemeClr val="lt1"/>
+          </a:fontRef>
+        </p:style>
+        <p:txBody>
+          <a:bodyPr rtlCol="0" anchor="ctr"/>
+          <a:lstStyle/>
+          <a:p>
+            <a:pPr algn="ctr"/>
+            <a:r>
+              <a:rPr lang="fr-FR" smtClean="0"/>
+              <a:t>Service</a:t>
+            </a:r>
+          </a:p>
+          <a:p>
+            <a:pPr algn="ctr"/>
+            <a:r>
+              <a:rPr lang="fr-FR" sz="1500" i="1" smtClean="0"/>
+              <a:t>Programme C#</a:t>
+            </a:r>
+            <a:endParaRPr lang="fr-FR" sz="1500" i="1"/>
+          </a:p>
+        </p:txBody>
+      </p:sp>
+      <p:sp>
+        <p:nvSpPr>
+          <p:cNvPr id="6" name="Rectangle 5"/>
+          <p:cNvSpPr/>
+          <p:nvPr/>
+        </p:nvSpPr>
+        <p:spPr>
+          <a:xfrm>
+            <a:off x="5535660" y="3918857"/>
+            <a:ext cx="1688840" cy="1091681"/>
+          </a:xfrm>
+          <a:prstGeom prst="rect">
+            <a:avLst/>
+          </a:prstGeom>
+        </p:spPr>
+        <p:style>
+          <a:lnRef idx="2">
+            <a:schemeClr val="accent1">
+              <a:shade val="50000"/>
+            </a:schemeClr>
+          </a:lnRef>
+          <a:fillRef idx="1">
+            <a:schemeClr val="accent1"/>
+          </a:fillRef>
+          <a:effectRef idx="0">
+            <a:schemeClr val="accent1"/>
+          </a:effectRef>
+          <a:fontRef idx="minor">
+            <a:schemeClr val="lt1"/>
+          </a:fontRef>
+        </p:style>
+        <p:txBody>
+          <a:bodyPr rtlCol="0" anchor="ctr"/>
+          <a:lstStyle/>
+          <a:p>
+            <a:pPr algn="ctr"/>
+            <a:r>
+              <a:rPr lang="fr-FR" smtClean="0"/>
+              <a:t>Hébergeur (IIS)</a:t>
+            </a:r>
+            <a:endParaRPr lang="fr-FR"/>
+          </a:p>
+        </p:txBody>
+      </p:sp>
+      <p:cxnSp>
+        <p:nvCxnSpPr>
+          <p:cNvPr id="8" name="Straight Arrow Connector 7"/>
+          <p:cNvCxnSpPr/>
+          <p:nvPr/>
+        </p:nvCxnSpPr>
+        <p:spPr>
+          <a:xfrm>
+            <a:off x="7259214" y="4413378"/>
+            <a:ext cx="1418253" cy="0"/>
+          </a:xfrm>
+          <a:prstGeom prst="straightConnector1">
+            <a:avLst/>
+          </a:prstGeom>
+          <a:ln>
+            <a:tailEnd type="triangle"/>
+          </a:ln>
+        </p:spPr>
+        <p:style>
+          <a:lnRef idx="1">
+            <a:schemeClr val="accent1"/>
+          </a:lnRef>
+          <a:fillRef idx="0">
+            <a:schemeClr val="accent1"/>
+          </a:fillRef>
+          <a:effectRef idx="0">
+            <a:schemeClr val="accent1"/>
+          </a:effectRef>
+          <a:fontRef idx="minor">
+            <a:schemeClr val="tx1"/>
+          </a:fontRef>
+        </p:style>
+      </p:cxnSp>
+      <p:cxnSp>
+        <p:nvCxnSpPr>
+          <p:cNvPr id="10" name="Straight Arrow Connector 9"/>
+          <p:cNvCxnSpPr>
+            <a:stCxn id="4" idx="3"/>
+          </p:cNvCxnSpPr>
+          <p:nvPr/>
+        </p:nvCxnSpPr>
+        <p:spPr>
+          <a:xfrm>
+            <a:off x="11539910" y="4413378"/>
+            <a:ext cx="671804" cy="0"/>
+          </a:xfrm>
+          <a:prstGeom prst="straightConnector1">
+            <a:avLst/>
+          </a:prstGeom>
+          <a:ln>
+            <a:tailEnd type="triangle"/>
+          </a:ln>
+        </p:spPr>
+        <p:style>
+          <a:lnRef idx="1">
+            <a:schemeClr val="accent1"/>
+          </a:lnRef>
+          <a:fillRef idx="0">
+            <a:schemeClr val="accent1"/>
+          </a:fillRef>
+          <a:effectRef idx="0">
+            <a:schemeClr val="accent1"/>
+          </a:effectRef>
+          <a:fontRef idx="minor">
+            <a:schemeClr val="tx1"/>
+          </a:fontRef>
+        </p:style>
+      </p:cxnSp>
+      <p:sp>
+        <p:nvSpPr>
+          <p:cNvPr id="13" name="TextBox 12"/>
+          <p:cNvSpPr txBox="1"/>
+          <p:nvPr/>
+        </p:nvSpPr>
+        <p:spPr>
+          <a:xfrm>
+            <a:off x="7312590" y="3642057"/>
+            <a:ext cx="1187596" cy="1477328"/>
+          </a:xfrm>
+          <a:prstGeom prst="rect">
+            <a:avLst/>
+          </a:prstGeom>
+          <a:noFill/>
+        </p:spPr>
+        <p:txBody>
+          <a:bodyPr wrap="square" rtlCol="0">
+            <a:spAutoFit/>
+          </a:bodyPr>
+          <a:lstStyle/>
+          <a:p>
+            <a:r>
+              <a:rPr lang="fr-FR" sz="1500" smtClean="0"/>
+              <a:t>Instancie un nouveau controlleur à chaque requete</a:t>
+            </a:r>
+            <a:endParaRPr lang="fr-FR" sz="1500"/>
+          </a:p>
+        </p:txBody>
+      </p:sp>
+      <p:cxnSp>
+        <p:nvCxnSpPr>
+          <p:cNvPr id="15" name="Straight Arrow Connector 14"/>
+          <p:cNvCxnSpPr>
+            <a:endCxn id="4" idx="3"/>
+          </p:cNvCxnSpPr>
+          <p:nvPr/>
+        </p:nvCxnSpPr>
+        <p:spPr>
+          <a:xfrm flipV="1">
+            <a:off x="10963468" y="4413378"/>
+            <a:ext cx="576442" cy="32656"/>
+          </a:xfrm>
+          <a:prstGeom prst="straightConnector1">
+            <a:avLst/>
+          </a:prstGeom>
+          <a:ln>
+            <a:tailEnd type="triangle"/>
+          </a:ln>
+        </p:spPr>
+        <p:style>
+          <a:lnRef idx="1">
+            <a:schemeClr val="accent1"/>
+          </a:lnRef>
+          <a:fillRef idx="0">
+            <a:schemeClr val="accent1"/>
+          </a:fillRef>
+          <a:effectRef idx="0">
+            <a:schemeClr val="accent1"/>
+          </a:effectRef>
+          <a:fontRef idx="minor">
+            <a:schemeClr val="tx1"/>
+          </a:fontRef>
+        </p:style>
+      </p:cxnSp>
+      <p:sp>
+        <p:nvSpPr>
+          <p:cNvPr id="16" name="TextBox 15"/>
+          <p:cNvSpPr txBox="1"/>
+          <p:nvPr/>
+        </p:nvSpPr>
+        <p:spPr>
+          <a:xfrm>
+            <a:off x="10356980" y="3918856"/>
+            <a:ext cx="1182930" cy="646331"/>
+          </a:xfrm>
+          <a:prstGeom prst="rect">
+            <a:avLst/>
+          </a:prstGeom>
+          <a:noFill/>
+        </p:spPr>
+        <p:txBody>
+          <a:bodyPr wrap="square" rtlCol="0">
+            <a:spAutoFit/>
+          </a:bodyPr>
+          <a:lstStyle/>
+          <a:p>
+            <a:r>
+              <a:rPr lang="fr-FR" smtClean="0"/>
+              <a:t>Données en sortie</a:t>
+            </a:r>
+            <a:endParaRPr lang="fr-FR"/>
+          </a:p>
+        </p:txBody>
+      </p:sp>
+      <p:sp>
+        <p:nvSpPr>
+          <p:cNvPr id="19" name="Rectangle 18"/>
+          <p:cNvSpPr/>
+          <p:nvPr/>
+        </p:nvSpPr>
+        <p:spPr>
+          <a:xfrm>
+            <a:off x="755779" y="2565918"/>
+            <a:ext cx="1558212" cy="933062"/>
+          </a:xfrm>
+          <a:prstGeom prst="rect">
+            <a:avLst/>
+          </a:prstGeom>
+        </p:spPr>
+        <p:style>
+          <a:lnRef idx="2">
+            <a:schemeClr val="accent1">
+              <a:shade val="50000"/>
+            </a:schemeClr>
+          </a:lnRef>
+          <a:fillRef idx="1">
+            <a:schemeClr val="accent1"/>
+          </a:fillRef>
+          <a:effectRef idx="0">
+            <a:schemeClr val="accent1"/>
+          </a:effectRef>
+          <a:fontRef idx="minor">
+            <a:schemeClr val="lt1"/>
+          </a:fontRef>
+        </p:style>
+        <p:txBody>
+          <a:bodyPr rtlCol="0" anchor="ctr"/>
+          <a:lstStyle/>
+          <a:p>
+            <a:pPr algn="ctr"/>
+            <a:r>
+              <a:rPr lang="fr-FR" smtClean="0"/>
+              <a:t>Client 1</a:t>
+            </a:r>
+          </a:p>
+          <a:p>
+            <a:pPr algn="ctr"/>
+            <a:r>
+              <a:rPr lang="fr-FR" smtClean="0"/>
+              <a:t>Fiddler</a:t>
+            </a:r>
+            <a:endParaRPr lang="fr-FR"/>
+          </a:p>
+        </p:txBody>
+      </p:sp>
+      <p:sp>
+        <p:nvSpPr>
+          <p:cNvPr id="20" name="Rectangle 19"/>
+          <p:cNvSpPr/>
+          <p:nvPr/>
+        </p:nvSpPr>
+        <p:spPr>
+          <a:xfrm>
+            <a:off x="751112" y="3878126"/>
+            <a:ext cx="1558212" cy="933062"/>
+          </a:xfrm>
+          <a:prstGeom prst="rect">
+            <a:avLst/>
+          </a:prstGeom>
+        </p:spPr>
+        <p:style>
+          <a:lnRef idx="2">
+            <a:schemeClr val="accent1">
+              <a:shade val="50000"/>
+            </a:schemeClr>
+          </a:lnRef>
+          <a:fillRef idx="1">
+            <a:schemeClr val="accent1"/>
+          </a:fillRef>
+          <a:effectRef idx="0">
+            <a:schemeClr val="accent1"/>
+          </a:effectRef>
+          <a:fontRef idx="minor">
+            <a:schemeClr val="lt1"/>
+          </a:fontRef>
+        </p:style>
+        <p:txBody>
+          <a:bodyPr rtlCol="0" anchor="ctr"/>
+          <a:lstStyle/>
+          <a:p>
+            <a:pPr algn="ctr"/>
+            <a:r>
+              <a:rPr lang="fr-FR" smtClean="0"/>
+              <a:t>Client 2</a:t>
+            </a:r>
+          </a:p>
+          <a:p>
+            <a:pPr algn="ctr"/>
+            <a:r>
+              <a:rPr lang="fr-FR" smtClean="0"/>
+              <a:t>Navigateur</a:t>
+            </a:r>
+            <a:endParaRPr lang="fr-FR"/>
+          </a:p>
+        </p:txBody>
+      </p:sp>
+      <p:sp>
+        <p:nvSpPr>
+          <p:cNvPr id="21" name="Rectangle 20"/>
+          <p:cNvSpPr/>
+          <p:nvPr/>
+        </p:nvSpPr>
+        <p:spPr>
+          <a:xfrm>
+            <a:off x="765110" y="5119385"/>
+            <a:ext cx="1558212" cy="933062"/>
+          </a:xfrm>
+          <a:prstGeom prst="rect">
+            <a:avLst/>
+          </a:prstGeom>
+        </p:spPr>
+        <p:style>
+          <a:lnRef idx="2">
+            <a:schemeClr val="accent1">
+              <a:shade val="50000"/>
+            </a:schemeClr>
+          </a:lnRef>
+          <a:fillRef idx="1">
+            <a:schemeClr val="accent1"/>
+          </a:fillRef>
+          <a:effectRef idx="0">
+            <a:schemeClr val="accent1"/>
+          </a:effectRef>
+          <a:fontRef idx="minor">
+            <a:schemeClr val="lt1"/>
+          </a:fontRef>
+        </p:style>
+        <p:txBody>
+          <a:bodyPr rtlCol="0" anchor="ctr"/>
+          <a:lstStyle/>
+          <a:p>
+            <a:pPr algn="ctr"/>
+            <a:r>
+              <a:rPr lang="fr-FR" smtClean="0"/>
+              <a:t>Client 3</a:t>
+            </a:r>
+          </a:p>
+          <a:p>
+            <a:pPr algn="ctr"/>
+            <a:r>
+              <a:rPr lang="fr-FR" smtClean="0"/>
+              <a:t>Programme C#</a:t>
+            </a:r>
+            <a:endParaRPr lang="fr-FR"/>
+          </a:p>
+        </p:txBody>
+      </p:sp>
+      <p:cxnSp>
+        <p:nvCxnSpPr>
+          <p:cNvPr id="23" name="Elbow Connector 22"/>
+          <p:cNvCxnSpPr>
+            <a:stCxn id="19" idx="3"/>
+          </p:cNvCxnSpPr>
+          <p:nvPr/>
+        </p:nvCxnSpPr>
+        <p:spPr>
+          <a:xfrm>
+            <a:off x="2313991" y="3032449"/>
+            <a:ext cx="3221669" cy="1432248"/>
+          </a:xfrm>
+          <a:prstGeom prst="bentConnector3">
+            <a:avLst/>
+          </a:prstGeom>
+          <a:ln>
+            <a:tailEnd type="triangle"/>
+          </a:ln>
+        </p:spPr>
+        <p:style>
+          <a:lnRef idx="1">
+            <a:schemeClr val="accent1"/>
+          </a:lnRef>
+          <a:fillRef idx="0">
+            <a:schemeClr val="accent1"/>
+          </a:fillRef>
+          <a:effectRef idx="0">
+            <a:schemeClr val="accent1"/>
+          </a:effectRef>
+          <a:fontRef idx="minor">
+            <a:schemeClr val="tx1"/>
+          </a:fontRef>
+        </p:style>
+      </p:cxnSp>
+      <p:cxnSp>
+        <p:nvCxnSpPr>
+          <p:cNvPr id="25" name="Straight Arrow Connector 24"/>
+          <p:cNvCxnSpPr>
+            <a:stCxn id="20" idx="3"/>
+          </p:cNvCxnSpPr>
+          <p:nvPr/>
+        </p:nvCxnSpPr>
+        <p:spPr>
+          <a:xfrm>
+            <a:off x="2309324" y="4344657"/>
+            <a:ext cx="1615501" cy="85049"/>
+          </a:xfrm>
+          <a:prstGeom prst="straightConnector1">
+            <a:avLst/>
+          </a:prstGeom>
+          <a:ln>
+            <a:tailEnd type="triangle"/>
+          </a:ln>
+        </p:spPr>
+        <p:style>
+          <a:lnRef idx="1">
+            <a:schemeClr val="accent1"/>
+          </a:lnRef>
+          <a:fillRef idx="0">
+            <a:schemeClr val="accent1"/>
+          </a:fillRef>
+          <a:effectRef idx="0">
+            <a:schemeClr val="accent1"/>
+          </a:effectRef>
+          <a:fontRef idx="minor">
+            <a:schemeClr val="tx1"/>
+          </a:fontRef>
+        </p:style>
+      </p:cxnSp>
+      <p:cxnSp>
+        <p:nvCxnSpPr>
+          <p:cNvPr id="27" name="Elbow Connector 26"/>
+          <p:cNvCxnSpPr>
+            <a:stCxn id="21" idx="3"/>
+          </p:cNvCxnSpPr>
+          <p:nvPr/>
+        </p:nvCxnSpPr>
+        <p:spPr>
+          <a:xfrm flipV="1">
+            <a:off x="2323322" y="4464697"/>
+            <a:ext cx="3132474" cy="1121219"/>
+          </a:xfrm>
+          <a:prstGeom prst="bentConnector3">
+            <a:avLst/>
+          </a:prstGeom>
+          <a:ln>
+            <a:tailEnd type="triangle"/>
+          </a:ln>
+        </p:spPr>
+        <p:style>
+          <a:lnRef idx="1">
+            <a:schemeClr val="accent1"/>
+          </a:lnRef>
+          <a:fillRef idx="0">
+            <a:schemeClr val="accent1"/>
+          </a:fillRef>
+          <a:effectRef idx="0">
+            <a:schemeClr val="accent1"/>
+          </a:effectRef>
+          <a:fontRef idx="minor">
+            <a:schemeClr val="tx1"/>
+          </a:fontRef>
+        </p:style>
+      </p:cxnSp>
+      <p:sp>
+        <p:nvSpPr>
+          <p:cNvPr id="29" name="TextBox 28"/>
+          <p:cNvSpPr txBox="1"/>
+          <p:nvPr/>
+        </p:nvSpPr>
+        <p:spPr>
+          <a:xfrm>
+            <a:off x="5072750" y="5075652"/>
+            <a:ext cx="2340942" cy="553998"/>
+          </a:xfrm>
+          <a:prstGeom prst="rect">
+            <a:avLst/>
+          </a:prstGeom>
+          <a:noFill/>
+        </p:spPr>
+        <p:txBody>
+          <a:bodyPr wrap="square" rtlCol="0">
+            <a:spAutoFit/>
+          </a:bodyPr>
+          <a:lstStyle/>
+          <a:p>
+            <a:r>
+              <a:rPr lang="fr-FR" sz="1500" smtClean="0"/>
+              <a:t>Ecoute s’il y a des requetes entrantes</a:t>
+            </a:r>
+            <a:endParaRPr lang="fr-FR" sz="1500"/>
+          </a:p>
+        </p:txBody>
+      </p:sp>
+    </p:spTree>
+    <p:extLst>
+      <p:ext uri="{BB962C8B-B14F-4D97-AF65-F5344CB8AC3E}">
+        <p14:creationId xmlns:p14="http://schemas.microsoft.com/office/powerpoint/2010/main" val="563853926"/>
+      </p:ext>
+    </p:extLst>
+  </p:cSld>
+  <p:clrMapOvr>
+    <a:masterClrMapping/>
+  </p:clrMapOvr>
+</p:sld>
+</file>
+
+<file path=ppt/slides/slide20.xml><?xml version="1.0" encoding="utf-8"?>
+<p:sld xmlns:a="http://schemas.openxmlformats.org/drawingml/2006/main" xmlns:r="http://schemas.openxmlformats.org/officeDocument/2006/relationships" xmlns:p="http://schemas.openxmlformats.org/presentationml/2006/main">
+  <p:cSld>
+    <p:spTree>
+      <p:nvGrpSpPr>
+        <p:cNvPr id="1" name=""/>
+        <p:cNvGrpSpPr/>
+        <p:nvPr/>
+      </p:nvGrpSpPr>
+      <p:grpSpPr>
+        <a:xfrm>
+          <a:off x="0" y="0"/>
+          <a:ext cx="0" cy="0"/>
+          <a:chOff x="0" y="0"/>
+          <a:chExt cx="0" cy="0"/>
+        </a:xfrm>
+      </p:grpSpPr>
+      <p:sp>
+        <p:nvSpPr>
+          <p:cNvPr id="2" name="Title 1"/>
+          <p:cNvSpPr>
+            <a:spLocks noGrp="1"/>
+          </p:cNvSpPr>
+          <p:nvPr>
+            <p:ph type="title"/>
+          </p:nvPr>
+        </p:nvSpPr>
+        <p:spPr/>
+        <p:txBody>
+          <a:bodyPr/>
+          <a:lstStyle/>
+          <a:p>
+            <a:r>
+              <a:rPr lang="fr-FR" smtClean="0"/>
+              <a:t>Implementing POST </a:t>
+            </a:r>
+            <a:endParaRPr lang="fr-FR"/>
+          </a:p>
+        </p:txBody>
+      </p:sp>
+      <p:sp>
+        <p:nvSpPr>
+          <p:cNvPr id="5" name="Content Placeholder 4"/>
+          <p:cNvSpPr>
+            <a:spLocks noGrp="1"/>
+          </p:cNvSpPr>
+          <p:nvPr>
+            <p:ph idx="1"/>
+          </p:nvPr>
+        </p:nvSpPr>
+        <p:spPr/>
+        <p:txBody>
+          <a:bodyPr/>
+          <a:lstStyle/>
+          <a:p>
+            <a:endParaRPr lang="fr-FR"/>
+          </a:p>
+        </p:txBody>
+      </p:sp>
+      <p:pic>
+        <p:nvPicPr>
+          <p:cNvPr id="6" name="Content Placeholder 3"/>
+          <p:cNvPicPr>
+            <a:picLocks noChangeAspect="1"/>
+          </p:cNvPicPr>
+          <p:nvPr/>
+        </p:nvPicPr>
+        <p:blipFill>
+          <a:blip r:embed="rId2"/>
+          <a:stretch>
+            <a:fillRect/>
+          </a:stretch>
+        </p:blipFill>
+        <p:spPr>
+          <a:xfrm>
+            <a:off x="1262161" y="1788584"/>
+            <a:ext cx="8144931" cy="5046132"/>
+          </a:xfrm>
+          <a:prstGeom prst="rect">
+            <a:avLst/>
+          </a:prstGeom>
+        </p:spPr>
+      </p:pic>
+      <p:sp>
+        <p:nvSpPr>
+          <p:cNvPr id="7" name="Right Arrow 6"/>
+          <p:cNvSpPr/>
+          <p:nvPr/>
+        </p:nvSpPr>
+        <p:spPr>
+          <a:xfrm rot="16200000">
+            <a:off x="4310742" y="2174162"/>
+            <a:ext cx="475862" cy="382814"/>
+          </a:xfrm>
+          <a:prstGeom prst="rightArrow">
+            <a:avLst/>
+          </a:prstGeom>
+        </p:spPr>
+        <p:style>
+          <a:lnRef idx="2">
+            <a:schemeClr val="accent1">
+              <a:shade val="50000"/>
+            </a:schemeClr>
+          </a:lnRef>
+          <a:fillRef idx="1">
+            <a:schemeClr val="accent1"/>
+          </a:fillRef>
+          <a:effectRef idx="0">
+            <a:schemeClr val="accent1"/>
+          </a:effectRef>
+          <a:fontRef idx="minor">
+            <a:schemeClr val="lt1"/>
+          </a:fontRef>
+        </p:style>
+        <p:txBody>
+          <a:bodyPr rtlCol="0" anchor="ctr"/>
+          <a:lstStyle/>
+          <a:p>
+            <a:pPr algn="r"/>
+            <a:endParaRPr lang="fr-FR"/>
+          </a:p>
+        </p:txBody>
+      </p:sp>
+      <p:sp>
+        <p:nvSpPr>
+          <p:cNvPr id="8" name="Right Arrow 7"/>
+          <p:cNvSpPr/>
+          <p:nvPr/>
+        </p:nvSpPr>
+        <p:spPr>
+          <a:xfrm rot="10800000">
+            <a:off x="6273280" y="5219052"/>
+            <a:ext cx="475862" cy="382814"/>
+          </a:xfrm>
+          <a:prstGeom prst="rightArrow">
+            <a:avLst/>
+          </a:prstGeom>
+        </p:spPr>
+        <p:style>
+          <a:lnRef idx="2">
+            <a:schemeClr val="accent1">
+              <a:shade val="50000"/>
+            </a:schemeClr>
+          </a:lnRef>
+          <a:fillRef idx="1">
+            <a:schemeClr val="accent1"/>
+          </a:fillRef>
+          <a:effectRef idx="0">
+            <a:schemeClr val="accent1"/>
+          </a:effectRef>
+          <a:fontRef idx="minor">
+            <a:schemeClr val="lt1"/>
+          </a:fontRef>
+        </p:style>
+        <p:txBody>
+          <a:bodyPr rtlCol="0" anchor="ctr"/>
+          <a:lstStyle/>
+          <a:p>
+            <a:pPr algn="r"/>
+            <a:endParaRPr lang="fr-FR"/>
+          </a:p>
+        </p:txBody>
+      </p:sp>
+      <p:sp>
+        <p:nvSpPr>
+          <p:cNvPr id="9" name="Right Arrow 8"/>
+          <p:cNvSpPr/>
+          <p:nvPr/>
+        </p:nvSpPr>
+        <p:spPr>
+          <a:xfrm rot="10800000">
+            <a:off x="7610668" y="6276673"/>
+            <a:ext cx="475862" cy="382814"/>
+          </a:xfrm>
+          <a:prstGeom prst="rightArrow">
+            <a:avLst/>
+          </a:prstGeom>
+        </p:spPr>
+        <p:style>
+          <a:lnRef idx="2">
+            <a:schemeClr val="accent1">
+              <a:shade val="50000"/>
+            </a:schemeClr>
+          </a:lnRef>
+          <a:fillRef idx="1">
+            <a:schemeClr val="accent1"/>
+          </a:fillRef>
+          <a:effectRef idx="0">
+            <a:schemeClr val="accent1"/>
+          </a:effectRef>
+          <a:fontRef idx="minor">
+            <a:schemeClr val="lt1"/>
+          </a:fontRef>
+        </p:style>
+        <p:txBody>
+          <a:bodyPr rtlCol="0" anchor="ctr"/>
+          <a:lstStyle/>
+          <a:p>
+            <a:pPr algn="r"/>
+            <a:endParaRPr lang="fr-FR"/>
+          </a:p>
+        </p:txBody>
+      </p:sp>
+      <p:sp>
+        <p:nvSpPr>
+          <p:cNvPr id="10" name="TextBox 9"/>
+          <p:cNvSpPr txBox="1"/>
+          <p:nvPr/>
+        </p:nvSpPr>
+        <p:spPr>
+          <a:xfrm>
+            <a:off x="4759186" y="2138091"/>
+            <a:ext cx="5157181" cy="369332"/>
+          </a:xfrm>
+          <a:prstGeom prst="rect">
+            <a:avLst/>
+          </a:prstGeom>
+          <a:noFill/>
+        </p:spPr>
+        <p:txBody>
+          <a:bodyPr wrap="none" rtlCol="0">
+            <a:spAutoFit/>
+          </a:bodyPr>
+          <a:lstStyle/>
+          <a:p>
+            <a:r>
+              <a:rPr lang="fr-FR" i="1" smtClean="0"/>
+              <a:t>Les données sont dans le corps du message </a:t>
+            </a:r>
+            <a:endParaRPr lang="fr-FR" i="1"/>
+          </a:p>
+        </p:txBody>
+      </p:sp>
+      <p:sp>
+        <p:nvSpPr>
+          <p:cNvPr id="11" name="TextBox 10"/>
+          <p:cNvSpPr txBox="1"/>
+          <p:nvPr/>
+        </p:nvSpPr>
+        <p:spPr>
+          <a:xfrm>
+            <a:off x="6766449" y="5225793"/>
+            <a:ext cx="2927404" cy="369332"/>
+          </a:xfrm>
+          <a:prstGeom prst="rect">
+            <a:avLst/>
+          </a:prstGeom>
+          <a:noFill/>
+        </p:spPr>
+        <p:txBody>
+          <a:bodyPr wrap="none" rtlCol="0">
+            <a:spAutoFit/>
+          </a:bodyPr>
+          <a:lstStyle/>
+          <a:p>
+            <a:r>
+              <a:rPr lang="fr-FR" i="1" smtClean="0"/>
+              <a:t>On renvoit l’entité créée</a:t>
+            </a:r>
+            <a:endParaRPr lang="fr-FR" i="1"/>
+          </a:p>
+        </p:txBody>
+      </p:sp>
+      <p:sp>
+        <p:nvSpPr>
+          <p:cNvPr id="12" name="TextBox 11"/>
+          <p:cNvSpPr txBox="1"/>
+          <p:nvPr/>
+        </p:nvSpPr>
+        <p:spPr>
+          <a:xfrm>
+            <a:off x="4457821" y="5931211"/>
+            <a:ext cx="5759910" cy="369332"/>
+          </a:xfrm>
+          <a:prstGeom prst="rect">
+            <a:avLst/>
+          </a:prstGeom>
+          <a:noFill/>
+        </p:spPr>
+        <p:txBody>
+          <a:bodyPr wrap="none" rtlCol="0">
+            <a:spAutoFit/>
+          </a:bodyPr>
+          <a:lstStyle/>
+          <a:p>
+            <a:r>
+              <a:rPr lang="fr-FR" i="1" smtClean="0"/>
+              <a:t>En cas d’erreur on retourne un code HTTP d’erreur</a:t>
+            </a:r>
+            <a:endParaRPr lang="fr-FR" i="1"/>
+          </a:p>
+        </p:txBody>
+      </p:sp>
+    </p:spTree>
+    <p:extLst>
+      <p:ext uri="{BB962C8B-B14F-4D97-AF65-F5344CB8AC3E}">
+        <p14:creationId xmlns:p14="http://schemas.microsoft.com/office/powerpoint/2010/main" val="2051450129"/>
+      </p:ext>
+    </p:extLst>
+  </p:cSld>
+  <p:clrMapOvr>
+    <a:masterClrMapping/>
+  </p:clrMapOvr>
+</p:sld>
+</file>
+
+<file path=ppt/slides/slide21.xml><?xml version="1.0" encoding="utf-8"?>
+<p:sld xmlns:a="http://schemas.openxmlformats.org/drawingml/2006/main" xmlns:r="http://schemas.openxmlformats.org/officeDocument/2006/relationships" xmlns:p="http://schemas.openxmlformats.org/presentationml/2006/main">
+  <p:cSld>
+    <p:spTree>
+      <p:nvGrpSpPr>
+        <p:cNvPr id="1" name=""/>
+        <p:cNvGrpSpPr/>
+        <p:nvPr/>
+      </p:nvGrpSpPr>
+      <p:grpSpPr>
+        <a:xfrm>
+          <a:off x="0" y="0"/>
+          <a:ext cx="0" cy="0"/>
+          <a:chOff x="0" y="0"/>
+          <a:chExt cx="0" cy="0"/>
+        </a:xfrm>
+      </p:grpSpPr>
+      <p:sp>
+        <p:nvSpPr>
+          <p:cNvPr id="2" name="Title 1"/>
+          <p:cNvSpPr>
+            <a:spLocks noGrp="1"/>
+          </p:cNvSpPr>
+          <p:nvPr>
+            <p:ph type="title"/>
+          </p:nvPr>
+        </p:nvSpPr>
+        <p:spPr/>
+        <p:txBody>
+          <a:bodyPr/>
+          <a:lstStyle/>
+          <a:p>
+            <a:r>
+              <a:rPr lang="fr-FR" smtClean="0"/>
+              <a:t>Exercice : Insérer en base une nouvelle entrée</a:t>
+            </a:r>
+            <a:endParaRPr lang="fr-FR"/>
+          </a:p>
+        </p:txBody>
+      </p:sp>
+      <p:sp>
+        <p:nvSpPr>
+          <p:cNvPr id="3" name="Content Placeholder 2"/>
+          <p:cNvSpPr>
+            <a:spLocks noGrp="1"/>
+          </p:cNvSpPr>
+          <p:nvPr>
+            <p:ph idx="1"/>
+          </p:nvPr>
+        </p:nvSpPr>
+        <p:spPr/>
+        <p:txBody>
+          <a:bodyPr/>
+          <a:lstStyle/>
+          <a:p>
+            <a:r>
+              <a:rPr lang="fr-FR" smtClean="0"/>
+              <a:t>Au choix travailler avec Pendu ou NorthWind </a:t>
+            </a:r>
+          </a:p>
+          <a:p>
+            <a:r>
+              <a:rPr lang="fr-FR" smtClean="0"/>
+              <a:t>Ecrire la méthode POST dans le controlleur pour insérer en base une nouvelle ligne</a:t>
+            </a:r>
+          </a:p>
+          <a:p>
+            <a:r>
+              <a:rPr lang="fr-FR" smtClean="0"/>
+              <a:t>Avec Fiddler générer la requete pour tester que l’insertion se passe bien</a:t>
+            </a:r>
+          </a:p>
+          <a:p>
+            <a:r>
+              <a:rPr lang="fr-FR" smtClean="0"/>
+              <a:t>Que se passe t-il s’il manque des données dans notre message ?</a:t>
+            </a:r>
+            <a:endParaRPr lang="fr-FR"/>
+          </a:p>
+        </p:txBody>
+      </p:sp>
+    </p:spTree>
+    <p:extLst>
+      <p:ext uri="{BB962C8B-B14F-4D97-AF65-F5344CB8AC3E}">
+        <p14:creationId xmlns:p14="http://schemas.microsoft.com/office/powerpoint/2010/main" val="1040840323"/>
+      </p:ext>
+    </p:extLst>
+  </p:cSld>
+  <p:clrMapOvr>
+    <a:masterClrMapping/>
+  </p:clrMapOvr>
+</p:sld>
+</file>
+
+<file path=ppt/slides/slide22.xml><?xml version="1.0" encoding="utf-8"?>
+<p:sld xmlns:a="http://schemas.openxmlformats.org/drawingml/2006/main" xmlns:r="http://schemas.openxmlformats.org/officeDocument/2006/relationships" xmlns:p="http://schemas.openxmlformats.org/presentationml/2006/main">
+  <p:cSld>
+    <p:spTree>
+      <p:nvGrpSpPr>
+        <p:cNvPr id="1" name=""/>
+        <p:cNvGrpSpPr/>
+        <p:nvPr/>
+      </p:nvGrpSpPr>
+      <p:grpSpPr>
+        <a:xfrm>
+          <a:off x="0" y="0"/>
+          <a:ext cx="0" cy="0"/>
+          <a:chOff x="0" y="0"/>
+          <a:chExt cx="0" cy="0"/>
+        </a:xfrm>
+      </p:grpSpPr>
+      <p:sp>
+        <p:nvSpPr>
+          <p:cNvPr id="2" name="Title 1"/>
+          <p:cNvSpPr>
+            <a:spLocks noGrp="1"/>
+          </p:cNvSpPr>
+          <p:nvPr>
+            <p:ph type="title"/>
+          </p:nvPr>
+        </p:nvSpPr>
+        <p:spPr/>
+        <p:txBody>
+          <a:bodyPr/>
+          <a:lstStyle/>
+          <a:p>
+            <a:r>
+              <a:rPr lang="fr-FR" smtClean="0"/>
+              <a:t>DELETE</a:t>
+            </a:r>
+            <a:endParaRPr lang="fr-FR"/>
+          </a:p>
+        </p:txBody>
+      </p:sp>
+      <p:sp>
+        <p:nvSpPr>
+          <p:cNvPr id="3" name="Content Placeholder 2"/>
+          <p:cNvSpPr>
+            <a:spLocks noGrp="1"/>
+          </p:cNvSpPr>
+          <p:nvPr>
+            <p:ph idx="1"/>
+          </p:nvPr>
+        </p:nvSpPr>
+        <p:spPr/>
+        <p:txBody>
+          <a:bodyPr/>
+          <a:lstStyle/>
+          <a:p>
+            <a:r>
+              <a:rPr lang="fr-FR" smtClean="0"/>
+              <a:t>Implementer une instruction Delete ( similaire au GET, l’id de l’entité à supprimer est passée dans l’url)</a:t>
+            </a:r>
+          </a:p>
+          <a:p>
+            <a:r>
+              <a:rPr lang="fr-FR" smtClean="0"/>
+              <a:t>En cas de succes retourner HttpStatusCode.Ok</a:t>
+            </a:r>
+          </a:p>
+          <a:p>
+            <a:r>
+              <a:rPr lang="fr-FR" smtClean="0"/>
+              <a:t>Tester avec fiddler</a:t>
+            </a:r>
+            <a:endParaRPr lang="fr-FR"/>
+          </a:p>
+        </p:txBody>
+      </p:sp>
+    </p:spTree>
+    <p:extLst>
+      <p:ext uri="{BB962C8B-B14F-4D97-AF65-F5344CB8AC3E}">
+        <p14:creationId xmlns:p14="http://schemas.microsoft.com/office/powerpoint/2010/main" val="604413362"/>
+      </p:ext>
+    </p:extLst>
+  </p:cSld>
+  <p:clrMapOvr>
+    <a:masterClrMapping/>
+  </p:clrMapOvr>
+</p:sld>
+</file>
+
+<file path=ppt/slides/slide23.xml><?xml version="1.0" encoding="utf-8"?>
+<p:sld xmlns:a="http://schemas.openxmlformats.org/drawingml/2006/main" xmlns:r="http://schemas.openxmlformats.org/officeDocument/2006/relationships" xmlns:p="http://schemas.openxmlformats.org/presentationml/2006/main">
+  <p:cSld>
+    <p:spTree>
+      <p:nvGrpSpPr>
+        <p:cNvPr id="1" name=""/>
+        <p:cNvGrpSpPr/>
+        <p:nvPr/>
+      </p:nvGrpSpPr>
+      <p:grpSpPr>
+        <a:xfrm>
+          <a:off x="0" y="0"/>
+          <a:ext cx="0" cy="0"/>
+          <a:chOff x="0" y="0"/>
+          <a:chExt cx="0" cy="0"/>
+        </a:xfrm>
+      </p:grpSpPr>
+      <p:sp>
+        <p:nvSpPr>
+          <p:cNvPr id="2" name="Title 1"/>
+          <p:cNvSpPr>
+            <a:spLocks noGrp="1"/>
+          </p:cNvSpPr>
+          <p:nvPr>
+            <p:ph type="title"/>
+          </p:nvPr>
+        </p:nvSpPr>
+        <p:spPr/>
+        <p:txBody>
+          <a:bodyPr/>
+          <a:lstStyle/>
+          <a:p>
+            <a:r>
+              <a:rPr lang="fr-FR" smtClean="0"/>
+              <a:t>PUT/PATCH pour mettre à jour </a:t>
+            </a:r>
+            <a:endParaRPr lang="fr-FR"/>
+          </a:p>
+        </p:txBody>
+      </p:sp>
+      <p:sp>
+        <p:nvSpPr>
+          <p:cNvPr id="3" name="Content Placeholder 2"/>
+          <p:cNvSpPr>
+            <a:spLocks noGrp="1"/>
+          </p:cNvSpPr>
+          <p:nvPr>
+            <p:ph idx="1"/>
+          </p:nvPr>
+        </p:nvSpPr>
+        <p:spPr/>
+        <p:txBody>
+          <a:bodyPr/>
+          <a:lstStyle/>
+          <a:p>
+            <a:r>
+              <a:rPr lang="fr-FR" smtClean="0"/>
+              <a:t>Sert à modifier les valeurs d’une entité existante</a:t>
+            </a:r>
+          </a:p>
+          <a:p>
+            <a:r>
+              <a:rPr lang="fr-FR" smtClean="0"/>
+              <a:t>Il faut envoyer l’entité en entier avec un PUT</a:t>
+            </a:r>
+          </a:p>
+          <a:p>
+            <a:r>
+              <a:rPr lang="fr-FR" smtClean="0"/>
+              <a:t>Pour une modification sur une partie des propriétés de l’entité, on utilise PATCH</a:t>
+            </a:r>
+          </a:p>
+          <a:p>
+            <a:endParaRPr lang="fr-FR"/>
+          </a:p>
+        </p:txBody>
+      </p:sp>
+    </p:spTree>
+    <p:extLst>
+      <p:ext uri="{BB962C8B-B14F-4D97-AF65-F5344CB8AC3E}">
+        <p14:creationId xmlns:p14="http://schemas.microsoft.com/office/powerpoint/2010/main" val="727858983"/>
+      </p:ext>
+    </p:extLst>
+  </p:cSld>
+  <p:clrMapOvr>
+    <a:masterClrMapping/>
+  </p:clrMapOvr>
+</p:sld>
+</file>
+
+<file path=ppt/slides/slide24.xml><?xml version="1.0" encoding="utf-8"?>
+<p:sld xmlns:a="http://schemas.openxmlformats.org/drawingml/2006/main" xmlns:r="http://schemas.openxmlformats.org/officeDocument/2006/relationships" xmlns:p="http://schemas.openxmlformats.org/presentationml/2006/main">
+  <p:cSld>
+    <p:spTree>
+      <p:nvGrpSpPr>
+        <p:cNvPr id="1" name=""/>
+        <p:cNvGrpSpPr/>
+        <p:nvPr/>
+      </p:nvGrpSpPr>
+      <p:grpSpPr>
+        <a:xfrm>
+          <a:off x="0" y="0"/>
+          <a:ext cx="0" cy="0"/>
+          <a:chOff x="0" y="0"/>
+          <a:chExt cx="0" cy="0"/>
+        </a:xfrm>
+      </p:grpSpPr>
+      <p:sp>
+        <p:nvSpPr>
+          <p:cNvPr id="2" name="Title 1"/>
+          <p:cNvSpPr>
+            <a:spLocks noGrp="1"/>
+          </p:cNvSpPr>
+          <p:nvPr>
+            <p:ph type="ctrTitle"/>
+          </p:nvPr>
+        </p:nvSpPr>
+        <p:spPr/>
+        <p:txBody>
+          <a:bodyPr/>
+          <a:lstStyle/>
+          <a:p>
+            <a:r>
+              <a:rPr lang="fr-FR" smtClean="0"/>
+              <a:t>Sécuriser son API</a:t>
+            </a:r>
+            <a:endParaRPr lang="fr-FR"/>
+          </a:p>
+        </p:txBody>
+      </p:sp>
+      <p:sp>
+        <p:nvSpPr>
+          <p:cNvPr id="3" name="Subtitle 2"/>
+          <p:cNvSpPr>
+            <a:spLocks noGrp="1"/>
+          </p:cNvSpPr>
+          <p:nvPr>
+            <p:ph type="subTitle" idx="1"/>
+          </p:nvPr>
+        </p:nvSpPr>
+        <p:spPr/>
+        <p:txBody>
+          <a:bodyPr/>
+          <a:lstStyle/>
+          <a:p>
+            <a:r>
+              <a:rPr lang="fr-FR" smtClean="0"/>
+              <a:t>Don’t worry be api</a:t>
+            </a:r>
+            <a:endParaRPr lang="fr-FR"/>
+          </a:p>
+        </p:txBody>
+      </p:sp>
+    </p:spTree>
+    <p:extLst>
+      <p:ext uri="{BB962C8B-B14F-4D97-AF65-F5344CB8AC3E}">
+        <p14:creationId xmlns:p14="http://schemas.microsoft.com/office/powerpoint/2010/main" val="991353990"/>
+      </p:ext>
+    </p:extLst>
+  </p:cSld>
+  <p:clrMapOvr>
+    <a:masterClrMapping/>
+  </p:clrMapOvr>
+</p:sld>
+</file>
+
+<file path=ppt/slides/slide25.xml><?xml version="1.0" encoding="utf-8"?>
+<p:sld xmlns:a="http://schemas.openxmlformats.org/drawingml/2006/main" xmlns:r="http://schemas.openxmlformats.org/officeDocument/2006/relationships" xmlns:p="http://schemas.openxmlformats.org/presentationml/2006/main">
+  <p:cSld>
+    <p:spTree>
+      <p:nvGrpSpPr>
+        <p:cNvPr id="1" name=""/>
+        <p:cNvGrpSpPr/>
+        <p:nvPr/>
+      </p:nvGrpSpPr>
+      <p:grpSpPr>
+        <a:xfrm>
+          <a:off x="0" y="0"/>
+          <a:ext cx="0" cy="0"/>
+          <a:chOff x="0" y="0"/>
+          <a:chExt cx="0" cy="0"/>
+        </a:xfrm>
+      </p:grpSpPr>
+      <p:sp>
+        <p:nvSpPr>
+          <p:cNvPr id="2" name="Title 1"/>
+          <p:cNvSpPr>
+            <a:spLocks noGrp="1"/>
+          </p:cNvSpPr>
+          <p:nvPr>
+            <p:ph type="title"/>
+          </p:nvPr>
+        </p:nvSpPr>
+        <p:spPr/>
+        <p:txBody>
+          <a:bodyPr/>
+          <a:lstStyle/>
+          <a:p>
+            <a:r>
+              <a:rPr lang="fr-FR" smtClean="0"/>
+              <a:t>A-t-on besoin de sécuriser notre API ?</a:t>
+            </a:r>
+            <a:endParaRPr lang="fr-FR"/>
+          </a:p>
+        </p:txBody>
+      </p:sp>
+      <p:sp>
+        <p:nvSpPr>
+          <p:cNvPr id="3" name="Content Placeholder 2"/>
+          <p:cNvSpPr>
+            <a:spLocks noGrp="1"/>
+          </p:cNvSpPr>
+          <p:nvPr>
+            <p:ph idx="1"/>
+          </p:nvPr>
+        </p:nvSpPr>
+        <p:spPr/>
+        <p:txBody>
+          <a:bodyPr>
+            <a:normAutofit lnSpcReduction="10000"/>
+          </a:bodyPr>
+          <a:lstStyle/>
+          <a:p>
+            <a:r>
+              <a:rPr lang="fr-FR" sz="2000" smtClean="0"/>
+              <a:t>Nous devons sécuriser notre Api si :</a:t>
+            </a:r>
+          </a:p>
+          <a:p>
+            <a:pPr lvl="1"/>
+            <a:r>
+              <a:rPr lang="fr-FR" sz="2000" smtClean="0"/>
+              <a:t>On utilise des données privées ou personnalisées</a:t>
+            </a:r>
+          </a:p>
+          <a:p>
+            <a:pPr lvl="1"/>
+            <a:r>
+              <a:rPr lang="fr-FR" sz="2000" smtClean="0"/>
+              <a:t> On envoie des données sensibles sur le réseau</a:t>
+            </a:r>
+          </a:p>
+          <a:p>
+            <a:pPr lvl="1"/>
+            <a:r>
+              <a:rPr lang="fr-FR" sz="2000" smtClean="0"/>
+              <a:t>On utilise des mots de passe/informations d’identitication</a:t>
+            </a:r>
+          </a:p>
+          <a:p>
+            <a:pPr lvl="1"/>
+            <a:r>
+              <a:rPr lang="fr-FR" sz="2000" smtClean="0"/>
+              <a:t>On essaye de protéger son serveur contre des intrusions/utilisations non voulues</a:t>
+            </a:r>
+          </a:p>
+          <a:p>
+            <a:pPr marL="457200" lvl="1" indent="0">
+              <a:buNone/>
+            </a:pPr>
+            <a:endParaRPr lang="fr-FR" sz="2000"/>
+          </a:p>
+          <a:p>
+            <a:pPr marL="457200" lvl="1" indent="0">
+              <a:buNone/>
+            </a:pPr>
+            <a:r>
+              <a:rPr lang="fr-FR" sz="2000" b="1" smtClean="0"/>
+              <a:t>Sécuriser une API  = restreindre l’accès/ l’utilisation des services exposés à certaines personnes/programmes</a:t>
+            </a:r>
+            <a:endParaRPr lang="fr-FR" sz="2000" b="1"/>
+          </a:p>
+        </p:txBody>
+      </p:sp>
+    </p:spTree>
+    <p:extLst>
+      <p:ext uri="{BB962C8B-B14F-4D97-AF65-F5344CB8AC3E}">
+        <p14:creationId xmlns:p14="http://schemas.microsoft.com/office/powerpoint/2010/main" val="4127882415"/>
+      </p:ext>
+    </p:extLst>
+  </p:cSld>
+  <p:clrMapOvr>
+    <a:masterClrMapping/>
+  </p:clrMapOvr>
+</p:sld>
+</file>
+
+<file path=ppt/slides/slide26.xml><?xml version="1.0" encoding="utf-8"?>
+<p:sld xmlns:a="http://schemas.openxmlformats.org/drawingml/2006/main" xmlns:r="http://schemas.openxmlformats.org/officeDocument/2006/relationships" xmlns:p="http://schemas.openxmlformats.org/presentationml/2006/main">
+  <p:cSld>
+    <p:spTree>
+      <p:nvGrpSpPr>
+        <p:cNvPr id="1" name=""/>
+        <p:cNvGrpSpPr/>
+        <p:nvPr/>
+      </p:nvGrpSpPr>
+      <p:grpSpPr>
+        <a:xfrm>
+          <a:off x="0" y="0"/>
+          <a:ext cx="0" cy="0"/>
+          <a:chOff x="0" y="0"/>
+          <a:chExt cx="0" cy="0"/>
+        </a:xfrm>
+      </p:grpSpPr>
+      <p:sp>
+        <p:nvSpPr>
+          <p:cNvPr id="2" name="Title 1"/>
+          <p:cNvSpPr>
+            <a:spLocks noGrp="1"/>
+          </p:cNvSpPr>
+          <p:nvPr>
+            <p:ph type="title"/>
+          </p:nvPr>
+        </p:nvSpPr>
+        <p:spPr/>
+        <p:txBody>
+          <a:bodyPr/>
+          <a:lstStyle/>
+          <a:p>
+            <a:r>
+              <a:rPr lang="fr-FR" smtClean="0"/>
+              <a:t>D’où viennent les menaces ?</a:t>
+            </a:r>
+            <a:endParaRPr lang="fr-FR"/>
+          </a:p>
+        </p:txBody>
+      </p:sp>
+      <p:pic>
+        <p:nvPicPr>
+          <p:cNvPr id="4" name="Content Placeholder 3"/>
+          <p:cNvPicPr>
+            <a:picLocks noGrp="1" noChangeAspect="1"/>
+          </p:cNvPicPr>
+          <p:nvPr>
+            <p:ph idx="1"/>
+          </p:nvPr>
+        </p:nvPicPr>
+        <p:blipFill>
+          <a:blip r:embed="rId2"/>
+          <a:stretch>
+            <a:fillRect/>
+          </a:stretch>
+        </p:blipFill>
+        <p:spPr>
+          <a:xfrm>
+            <a:off x="1791102" y="2603500"/>
+            <a:ext cx="7554108" cy="3416300"/>
+          </a:xfrm>
+          <a:prstGeom prst="rect">
+            <a:avLst/>
+          </a:prstGeom>
+        </p:spPr>
+      </p:pic>
+    </p:spTree>
+    <p:extLst>
+      <p:ext uri="{BB962C8B-B14F-4D97-AF65-F5344CB8AC3E}">
+        <p14:creationId xmlns:p14="http://schemas.microsoft.com/office/powerpoint/2010/main" val="437123438"/>
+      </p:ext>
+    </p:extLst>
+  </p:cSld>
+  <p:clrMapOvr>
+    <a:masterClrMapping/>
+  </p:clrMapOvr>
+</p:sld>
+</file>
+
+<file path=ppt/slides/slide27.xml><?xml version="1.0" encoding="utf-8"?>
+<p:sld xmlns:a="http://schemas.openxmlformats.org/drawingml/2006/main" xmlns:r="http://schemas.openxmlformats.org/officeDocument/2006/relationships" xmlns:p="http://schemas.openxmlformats.org/presentationml/2006/main">
+  <p:cSld>
+    <p:spTree>
+      <p:nvGrpSpPr>
+        <p:cNvPr id="1" name=""/>
+        <p:cNvGrpSpPr/>
+        <p:nvPr/>
+      </p:nvGrpSpPr>
+      <p:grpSpPr>
+        <a:xfrm>
+          <a:off x="0" y="0"/>
+          <a:ext cx="0" cy="0"/>
+          <a:chOff x="0" y="0"/>
+          <a:chExt cx="0" cy="0"/>
+        </a:xfrm>
+      </p:grpSpPr>
+      <p:sp>
+        <p:nvSpPr>
+          <p:cNvPr id="2" name="Title 1"/>
+          <p:cNvSpPr>
+            <a:spLocks noGrp="1"/>
+          </p:cNvSpPr>
+          <p:nvPr>
+            <p:ph type="title"/>
+          </p:nvPr>
+        </p:nvSpPr>
+        <p:spPr/>
+        <p:txBody>
+          <a:bodyPr/>
+          <a:lstStyle/>
+          <a:p>
+            <a:r>
+              <a:rPr lang="fr-FR" smtClean="0"/>
+              <a:t>Actions à réaliser</a:t>
+            </a:r>
+            <a:endParaRPr lang="fr-FR"/>
+          </a:p>
+        </p:txBody>
+      </p:sp>
+      <p:sp>
+        <p:nvSpPr>
+          <p:cNvPr id="3" name="Content Placeholder 2"/>
+          <p:cNvSpPr>
+            <a:spLocks noGrp="1"/>
+          </p:cNvSpPr>
+          <p:nvPr>
+            <p:ph idx="1"/>
+          </p:nvPr>
+        </p:nvSpPr>
+        <p:spPr/>
+        <p:txBody>
+          <a:bodyPr/>
+          <a:lstStyle/>
+          <a:p>
+            <a:r>
+              <a:rPr lang="fr-FR" sz="2000" smtClean="0"/>
+              <a:t>Sécuriser le transport avec un chiffrage en SSL (Non traité ici)</a:t>
+            </a:r>
+          </a:p>
+          <a:p>
+            <a:r>
+              <a:rPr lang="fr-FR" sz="2000"/>
+              <a:t> </a:t>
+            </a:r>
+            <a:r>
+              <a:rPr lang="fr-FR" sz="2000" smtClean="0"/>
+              <a:t>Sécuriser l’API elle-même</a:t>
+            </a:r>
+          </a:p>
+          <a:p>
+            <a:pPr lvl="1"/>
+            <a:r>
+              <a:rPr lang="fr-FR" sz="2000"/>
+              <a:t>Cross Origin Security</a:t>
+            </a:r>
+          </a:p>
+          <a:p>
+            <a:pPr lvl="1"/>
+            <a:r>
+              <a:rPr lang="fr-FR" sz="2000" smtClean="0"/>
+              <a:t>Authentification des consommateurs de l’API</a:t>
+            </a:r>
+          </a:p>
+          <a:p>
+            <a:pPr marL="457200" lvl="1" indent="0">
+              <a:buNone/>
+            </a:pPr>
+            <a:endParaRPr lang="fr-FR"/>
+          </a:p>
+          <a:p>
+            <a:pPr marL="457200" lvl="1" indent="0">
+              <a:buNone/>
+            </a:pPr>
+            <a:endParaRPr lang="fr-FR"/>
+          </a:p>
+        </p:txBody>
+      </p:sp>
+    </p:spTree>
+    <p:extLst>
+      <p:ext uri="{BB962C8B-B14F-4D97-AF65-F5344CB8AC3E}">
+        <p14:creationId xmlns:p14="http://schemas.microsoft.com/office/powerpoint/2010/main" val="3230958345"/>
+      </p:ext>
+    </p:extLst>
+  </p:cSld>
+  <p:clrMapOvr>
+    <a:masterClrMapping/>
+  </p:clrMapOvr>
+</p:sld>
+</file>
+
+<file path=ppt/slides/slide28.xml><?xml version="1.0" encoding="utf-8"?>
+<p:sld xmlns:a="http://schemas.openxmlformats.org/drawingml/2006/main" xmlns:r="http://schemas.openxmlformats.org/officeDocument/2006/relationships" xmlns:p="http://schemas.openxmlformats.org/presentationml/2006/main">
+  <p:cSld>
+    <p:spTree>
+      <p:nvGrpSpPr>
+        <p:cNvPr id="1" name=""/>
+        <p:cNvGrpSpPr/>
+        <p:nvPr/>
+      </p:nvGrpSpPr>
+      <p:grpSpPr>
+        <a:xfrm>
+          <a:off x="0" y="0"/>
+          <a:ext cx="0" cy="0"/>
+          <a:chOff x="0" y="0"/>
+          <a:chExt cx="0" cy="0"/>
+        </a:xfrm>
+      </p:grpSpPr>
+      <p:sp>
+        <p:nvSpPr>
+          <p:cNvPr id="2" name="Title 1"/>
+          <p:cNvSpPr>
+            <a:spLocks noGrp="1"/>
+          </p:cNvSpPr>
+          <p:nvPr>
+            <p:ph type="title"/>
+          </p:nvPr>
+        </p:nvSpPr>
+        <p:spPr/>
+        <p:txBody>
+          <a:bodyPr/>
+          <a:lstStyle/>
+          <a:p>
+            <a:r>
+              <a:rPr lang="fr-FR" smtClean="0"/>
+              <a:t>CORS : Cross Origin Ressource Sharing</a:t>
+            </a:r>
+            <a:endParaRPr lang="fr-FR"/>
+          </a:p>
+        </p:txBody>
+      </p:sp>
+      <p:sp>
+        <p:nvSpPr>
+          <p:cNvPr id="3" name="Content Placeholder 2"/>
+          <p:cNvSpPr>
+            <a:spLocks noGrp="1"/>
+          </p:cNvSpPr>
+          <p:nvPr>
+            <p:ph idx="1"/>
+          </p:nvPr>
+        </p:nvSpPr>
+        <p:spPr/>
+        <p:txBody>
+          <a:bodyPr>
+            <a:normAutofit fontScale="92500"/>
+          </a:bodyPr>
+          <a:lstStyle/>
+          <a:p>
+            <a:r>
+              <a:rPr lang="fr-FR"/>
+              <a:t>Un agent utilisateur réalise une requête HTTP </a:t>
+            </a:r>
+            <a:r>
+              <a:rPr lang="fr-FR" b="1"/>
+              <a:t>multi-origine (</a:t>
+            </a:r>
+            <a:r>
+              <a:rPr lang="fr-FR" b="1" i="1"/>
+              <a:t>cross-origin</a:t>
+            </a:r>
+            <a:r>
+              <a:rPr lang="fr-FR" b="1"/>
+              <a:t>)</a:t>
+            </a:r>
+            <a:r>
+              <a:rPr lang="fr-FR"/>
+              <a:t> lorsqu'il demande une ressource provenant d'un domaine, d'un protocole ou d'un port différent de ceux utilisés pour la </a:t>
+            </a:r>
+            <a:r>
+              <a:rPr lang="fr-FR"/>
+              <a:t>page </a:t>
+            </a:r>
+            <a:r>
+              <a:rPr lang="fr-FR" smtClean="0"/>
+              <a:t>courante.</a:t>
+            </a:r>
+          </a:p>
+          <a:p>
+            <a:r>
+              <a:rPr lang="fr-FR" smtClean="0"/>
+              <a:t>Prenons </a:t>
+            </a:r>
+            <a:r>
+              <a:rPr lang="fr-FR"/>
+              <a:t>un exemple de requête multi-origine : une page HTML est servie depuis http://domaine-a.com contient un élément &lt;img&gt; src ciblant http://domaine-b.com/image.jpg</a:t>
+            </a:r>
+            <a:r>
+              <a:rPr lang="fr-FR"/>
+              <a:t>. </a:t>
+            </a:r>
+            <a:endParaRPr lang="fr-FR" smtClean="0"/>
+          </a:p>
+          <a:p>
+            <a:r>
+              <a:rPr lang="fr-FR" smtClean="0"/>
+              <a:t>Aujourd'hui</a:t>
+            </a:r>
+            <a:r>
+              <a:rPr lang="fr-FR"/>
+              <a:t>, de nombreuses pages web chargent leurs ressources (feuilles CSS, images, scripts) à partir de domaines séparés (par exemple des </a:t>
+            </a:r>
+            <a:r>
+              <a:rPr lang="fr-FR" b="1"/>
+              <a:t>CDN</a:t>
+            </a:r>
+            <a:r>
+              <a:rPr lang="fr-FR"/>
+              <a:t> (Content Delivery Network en anglais ou « Réseau de diffusion de </a:t>
+            </a:r>
+            <a:r>
+              <a:rPr lang="fr-FR"/>
+              <a:t>contenu </a:t>
+            </a:r>
+            <a:r>
+              <a:rPr lang="fr-FR" smtClean="0"/>
+              <a:t>»).</a:t>
+            </a:r>
+            <a:endParaRPr lang="fr-FR"/>
+          </a:p>
+          <a:p>
+            <a:r>
+              <a:rPr lang="fr-FR"/>
+              <a:t>Pour des raisons de sécurité</a:t>
+            </a:r>
+            <a:r>
+              <a:rPr lang="fr-FR" b="1"/>
+              <a:t>, les requêtes HTTP multi-origine émises depuis les scripts sont restreintes</a:t>
+            </a:r>
+          </a:p>
+          <a:p>
+            <a:endParaRPr lang="fr-FR"/>
+          </a:p>
+          <a:p>
+            <a:endParaRPr lang="fr-FR" smtClean="0"/>
+          </a:p>
+          <a:p>
+            <a:endParaRPr lang="fr-FR"/>
+          </a:p>
+          <a:p>
+            <a:endParaRPr lang="fr-FR"/>
+          </a:p>
+        </p:txBody>
+      </p:sp>
+    </p:spTree>
+    <p:extLst>
+      <p:ext uri="{BB962C8B-B14F-4D97-AF65-F5344CB8AC3E}">
+        <p14:creationId xmlns:p14="http://schemas.microsoft.com/office/powerpoint/2010/main" val="4091334662"/>
+      </p:ext>
+    </p:extLst>
+  </p:cSld>
+  <p:clrMapOvr>
+    <a:masterClrMapping/>
+  </p:clrMapOvr>
+</p:sld>
+</file>
+
+<file path=ppt/slides/slide29.xml><?xml version="1.0" encoding="utf-8"?>
+<p:sld xmlns:a="http://schemas.openxmlformats.org/drawingml/2006/main" xmlns:r="http://schemas.openxmlformats.org/officeDocument/2006/relationships" xmlns:p="http://schemas.openxmlformats.org/presentationml/2006/main">
+  <p:cSld>
+    <p:spTree>
+      <p:nvGrpSpPr>
+        <p:cNvPr id="1" name=""/>
+        <p:cNvGrpSpPr/>
+        <p:nvPr/>
+      </p:nvGrpSpPr>
+      <p:grpSpPr>
+        <a:xfrm>
+          <a:off x="0" y="0"/>
+          <a:ext cx="0" cy="0"/>
+          <a:chOff x="0" y="0"/>
+          <a:chExt cx="0" cy="0"/>
+        </a:xfrm>
+      </p:grpSpPr>
+      <p:sp>
+        <p:nvSpPr>
+          <p:cNvPr id="2" name="Title 1"/>
+          <p:cNvSpPr>
+            <a:spLocks noGrp="1"/>
+          </p:cNvSpPr>
+          <p:nvPr>
+            <p:ph type="title"/>
+          </p:nvPr>
+        </p:nvSpPr>
+        <p:spPr/>
+        <p:txBody>
+          <a:bodyPr/>
+          <a:lstStyle/>
+          <a:p>
+            <a:r>
+              <a:rPr lang="fr-FR" smtClean="0"/>
+              <a:t>CORS : Illustration</a:t>
+            </a:r>
+            <a:endParaRPr lang="fr-FR"/>
+          </a:p>
+        </p:txBody>
+      </p:sp>
+      <p:pic>
+        <p:nvPicPr>
+          <p:cNvPr id="6" name="Content Placeholder 3"/>
+          <p:cNvPicPr>
+            <a:picLocks noChangeAspect="1"/>
+          </p:cNvPicPr>
+          <p:nvPr/>
+        </p:nvPicPr>
+        <p:blipFill>
+          <a:blip r:embed="rId2"/>
+          <a:stretch>
+            <a:fillRect/>
+          </a:stretch>
+        </p:blipFill>
+        <p:spPr>
+          <a:xfrm>
+            <a:off x="2510004" y="2603500"/>
+            <a:ext cx="5239226" cy="3416300"/>
+          </a:xfrm>
+          <a:prstGeom prst="rect">
+            <a:avLst/>
+          </a:prstGeom>
+        </p:spPr>
+      </p:pic>
+    </p:spTree>
+    <p:extLst>
+      <p:ext uri="{BB962C8B-B14F-4D97-AF65-F5344CB8AC3E}">
+        <p14:creationId xmlns:p14="http://schemas.microsoft.com/office/powerpoint/2010/main" val="722498311"/>
+      </p:ext>
+    </p:extLst>
+  </p:cSld>
+  <p:clrMapOvr>
+    <a:masterClrMapping/>
+  </p:clrMapOvr>
+</p:sld>
+</file>
+
+<file path=ppt/slides/slide3.xml><?xml version="1.0" encoding="utf-8"?>
+<p:sld xmlns:a="http://schemas.openxmlformats.org/drawingml/2006/main" xmlns:r="http://schemas.openxmlformats.org/officeDocument/2006/relationships" xmlns:p="http://schemas.openxmlformats.org/presentationml/2006/main">
+  <p:cSld>
+    <p:spTree>
+      <p:nvGrpSpPr>
+        <p:cNvPr id="1" name=""/>
+        <p:cNvGrpSpPr/>
+        <p:nvPr/>
+      </p:nvGrpSpPr>
+      <p:grpSpPr>
+        <a:xfrm>
+          <a:off x="0" y="0"/>
+          <a:ext cx="0" cy="0"/>
+          <a:chOff x="0" y="0"/>
+          <a:chExt cx="0" cy="0"/>
+        </a:xfrm>
+      </p:grpSpPr>
+      <p:sp>
+        <p:nvSpPr>
+          <p:cNvPr id="2" name="Title 1"/>
+          <p:cNvSpPr>
+            <a:spLocks noGrp="1"/>
+          </p:cNvSpPr>
+          <p:nvPr>
+            <p:ph type="title"/>
+          </p:nvPr>
+        </p:nvSpPr>
+        <p:spPr/>
+        <p:txBody>
+          <a:bodyPr/>
+          <a:lstStyle/>
+          <a:p>
+            <a:r>
+              <a:rPr lang="fr-FR" smtClean="0"/>
               <a:t>Qu’est ce que WebAPI ?</a:t>
             </a:r>
             <a:endParaRPr lang="fr-FR"/>
@@ -13901,7 +16868,328 @@
 </p:sld>
 </file>
 
-<file path=ppt/slides/slide3.xml><?xml version="1.0" encoding="utf-8"?>
+<file path=ppt/slides/slide30.xml><?xml version="1.0" encoding="utf-8"?>
+<p:sld xmlns:a="http://schemas.openxmlformats.org/drawingml/2006/main" xmlns:r="http://schemas.openxmlformats.org/officeDocument/2006/relationships" xmlns:p="http://schemas.openxmlformats.org/presentationml/2006/main">
+  <p:cSld>
+    <p:spTree>
+      <p:nvGrpSpPr>
+        <p:cNvPr id="1" name=""/>
+        <p:cNvGrpSpPr/>
+        <p:nvPr/>
+      </p:nvGrpSpPr>
+      <p:grpSpPr>
+        <a:xfrm>
+          <a:off x="0" y="0"/>
+          <a:ext cx="0" cy="0"/>
+          <a:chOff x="0" y="0"/>
+          <a:chExt cx="0" cy="0"/>
+        </a:xfrm>
+      </p:grpSpPr>
+      <p:sp>
+        <p:nvSpPr>
+          <p:cNvPr id="2" name="Title 1"/>
+          <p:cNvSpPr>
+            <a:spLocks noGrp="1"/>
+          </p:cNvSpPr>
+          <p:nvPr>
+            <p:ph type="title"/>
+          </p:nvPr>
+        </p:nvSpPr>
+        <p:spPr/>
+        <p:txBody>
+          <a:bodyPr/>
+          <a:lstStyle/>
+          <a:p>
+            <a:r>
+              <a:rPr lang="fr-FR" smtClean="0"/>
+              <a:t>Activer CORS sur son API</a:t>
+            </a:r>
+            <a:endParaRPr lang="fr-FR"/>
+          </a:p>
+        </p:txBody>
+      </p:sp>
+      <p:sp>
+        <p:nvSpPr>
+          <p:cNvPr id="3" name="Content Placeholder 2"/>
+          <p:cNvSpPr>
+            <a:spLocks noGrp="1"/>
+          </p:cNvSpPr>
+          <p:nvPr>
+            <p:ph idx="1"/>
+          </p:nvPr>
+        </p:nvSpPr>
+        <p:spPr/>
+        <p:txBody>
+          <a:bodyPr/>
+          <a:lstStyle/>
+          <a:p>
+            <a:r>
+              <a:rPr lang="fr-FR" smtClean="0"/>
+              <a:t>Ajouter le Nuget  Microsoft.ASPNET.WebApi.Cors</a:t>
+            </a:r>
+          </a:p>
+          <a:p>
+            <a:r>
+              <a:rPr lang="fr-FR" smtClean="0"/>
+              <a:t>Dans Register de WebApiConfig.cs ajouter les lignes suivantes pour que tous nos controlleurs autorisent les requetes CORS. </a:t>
+            </a:r>
+          </a:p>
+          <a:p>
+            <a:endParaRPr lang="fr-FR"/>
+          </a:p>
+          <a:p>
+            <a:endParaRPr lang="fr-FR" smtClean="0"/>
+          </a:p>
+          <a:p>
+            <a:endParaRPr lang="fr-FR"/>
+          </a:p>
+        </p:txBody>
+      </p:sp>
+      <p:pic>
+        <p:nvPicPr>
+          <p:cNvPr id="4" name="Picture 3"/>
+          <p:cNvPicPr>
+            <a:picLocks noChangeAspect="1"/>
+          </p:cNvPicPr>
+          <p:nvPr/>
+        </p:nvPicPr>
+        <p:blipFill>
+          <a:blip r:embed="rId2"/>
+          <a:stretch>
+            <a:fillRect/>
+          </a:stretch>
+        </p:blipFill>
+        <p:spPr>
+          <a:xfrm>
+            <a:off x="2377264" y="3739631"/>
+            <a:ext cx="4991100" cy="647700"/>
+          </a:xfrm>
+          <a:prstGeom prst="rect">
+            <a:avLst/>
+          </a:prstGeom>
+        </p:spPr>
+      </p:pic>
+    </p:spTree>
+    <p:extLst>
+      <p:ext uri="{BB962C8B-B14F-4D97-AF65-F5344CB8AC3E}">
+        <p14:creationId xmlns:p14="http://schemas.microsoft.com/office/powerpoint/2010/main" val="2756336328"/>
+      </p:ext>
+    </p:extLst>
+  </p:cSld>
+  <p:clrMapOvr>
+    <a:masterClrMapping/>
+  </p:clrMapOvr>
+</p:sld>
+</file>
+
+<file path=ppt/slides/slide31.xml><?xml version="1.0" encoding="utf-8"?>
+<p:sld xmlns:a="http://schemas.openxmlformats.org/drawingml/2006/main" xmlns:r="http://schemas.openxmlformats.org/officeDocument/2006/relationships" xmlns:p="http://schemas.openxmlformats.org/presentationml/2006/main">
+  <p:cSld>
+    <p:spTree>
+      <p:nvGrpSpPr>
+        <p:cNvPr id="1" name=""/>
+        <p:cNvGrpSpPr/>
+        <p:nvPr/>
+      </p:nvGrpSpPr>
+      <p:grpSpPr>
+        <a:xfrm>
+          <a:off x="0" y="0"/>
+          <a:ext cx="0" cy="0"/>
+          <a:chOff x="0" y="0"/>
+          <a:chExt cx="0" cy="0"/>
+        </a:xfrm>
+      </p:grpSpPr>
+      <p:sp>
+        <p:nvSpPr>
+          <p:cNvPr id="2" name="Title 1"/>
+          <p:cNvSpPr>
+            <a:spLocks noGrp="1"/>
+          </p:cNvSpPr>
+          <p:nvPr>
+            <p:ph type="title"/>
+          </p:nvPr>
+        </p:nvSpPr>
+        <p:spPr/>
+        <p:txBody>
+          <a:bodyPr/>
+          <a:lstStyle/>
+          <a:p>
+            <a:r>
+              <a:rPr lang="fr-FR" smtClean="0"/>
+              <a:t>Authentification d’utilisateurs</a:t>
+            </a:r>
+            <a:endParaRPr lang="fr-FR"/>
+          </a:p>
+        </p:txBody>
+      </p:sp>
+      <p:sp>
+        <p:nvSpPr>
+          <p:cNvPr id="3" name="Content Placeholder 2"/>
+          <p:cNvSpPr>
+            <a:spLocks noGrp="1"/>
+          </p:cNvSpPr>
+          <p:nvPr>
+            <p:ph idx="1"/>
+          </p:nvPr>
+        </p:nvSpPr>
+        <p:spPr/>
+        <p:txBody>
+          <a:bodyPr/>
+          <a:lstStyle/>
+          <a:p>
+            <a:r>
+              <a:rPr lang="fr-FR" smtClean="0"/>
+              <a:t>Forms Authentication (Identity) : </a:t>
+            </a:r>
+            <a:r>
+              <a:rPr lang="fr-FR" sz="1600" smtClean="0"/>
+              <a:t>Rapide à implémenter mais</a:t>
+            </a:r>
+            <a:r>
+              <a:rPr lang="fr-FR" smtClean="0"/>
+              <a:t> </a:t>
+            </a:r>
+            <a:r>
+              <a:rPr lang="fr-FR" sz="1600" smtClean="0"/>
+              <a:t>peu adaptée aux WebApi : (Démo)</a:t>
+            </a:r>
+            <a:endParaRPr lang="fr-FR"/>
+          </a:p>
+          <a:p>
+            <a:r>
+              <a:rPr lang="fr-FR" smtClean="0"/>
+              <a:t>Basic Authentication</a:t>
+            </a:r>
+          </a:p>
+          <a:p>
+            <a:pPr lvl="1"/>
+            <a:r>
+              <a:rPr lang="fr-FR" smtClean="0"/>
+              <a:t>Stocker User/Mot de passe dans le header authorization  </a:t>
+            </a:r>
+          </a:p>
+          <a:p>
+            <a:pPr lvl="1"/>
+            <a:r>
+              <a:rPr lang="fr-FR" smtClean="0"/>
+              <a:t>Avant chaque action vérifier les credentials à l’aide d’un </a:t>
+            </a:r>
+            <a:r>
+              <a:rPr lang="fr-FR"/>
+              <a:t>AuthorizationFilterAttribute </a:t>
+            </a:r>
+            <a:endParaRPr lang="fr-FR"/>
+          </a:p>
+          <a:p>
+            <a:r>
+              <a:rPr lang="fr-FR" smtClean="0"/>
+              <a:t>Token Authentication (API Key) : </a:t>
+            </a:r>
+            <a:r>
+              <a:rPr lang="fr-FR" sz="1600" smtClean="0"/>
+              <a:t>cf schéma ci après</a:t>
+            </a:r>
+          </a:p>
+          <a:p>
+            <a:endParaRPr lang="fr-FR" smtClean="0"/>
+          </a:p>
+          <a:p>
+            <a:pPr lvl="1"/>
+            <a:endParaRPr lang="fr-FR"/>
+          </a:p>
+        </p:txBody>
+      </p:sp>
+    </p:spTree>
+    <p:extLst>
+      <p:ext uri="{BB962C8B-B14F-4D97-AF65-F5344CB8AC3E}">
+        <p14:creationId xmlns:p14="http://schemas.microsoft.com/office/powerpoint/2010/main" val="485809540"/>
+      </p:ext>
+    </p:extLst>
+  </p:cSld>
+  <p:clrMapOvr>
+    <a:masterClrMapping/>
+  </p:clrMapOvr>
+</p:sld>
+</file>
+
+<file path=ppt/slides/slide32.xml><?xml version="1.0" encoding="utf-8"?>
+<p:sld xmlns:a="http://schemas.openxmlformats.org/drawingml/2006/main" xmlns:r="http://schemas.openxmlformats.org/officeDocument/2006/relationships" xmlns:p="http://schemas.openxmlformats.org/presentationml/2006/main">
+  <p:cSld>
+    <p:spTree>
+      <p:nvGrpSpPr>
+        <p:cNvPr id="1" name=""/>
+        <p:cNvGrpSpPr/>
+        <p:nvPr/>
+      </p:nvGrpSpPr>
+      <p:grpSpPr>
+        <a:xfrm>
+          <a:off x="0" y="0"/>
+          <a:ext cx="0" cy="0"/>
+          <a:chOff x="0" y="0"/>
+          <a:chExt cx="0" cy="0"/>
+        </a:xfrm>
+      </p:grpSpPr>
+      <p:sp>
+        <p:nvSpPr>
+          <p:cNvPr id="2" name="Title 1"/>
+          <p:cNvSpPr>
+            <a:spLocks noGrp="1"/>
+          </p:cNvSpPr>
+          <p:nvPr>
+            <p:ph type="title"/>
+          </p:nvPr>
+        </p:nvSpPr>
+        <p:spPr/>
+        <p:txBody>
+          <a:bodyPr/>
+          <a:lstStyle/>
+          <a:p>
+            <a:r>
+              <a:rPr lang="fr-FR" smtClean="0"/>
+              <a:t>Token Authentication</a:t>
+            </a:r>
+            <a:endParaRPr lang="fr-FR"/>
+          </a:p>
+        </p:txBody>
+      </p:sp>
+      <p:pic>
+        <p:nvPicPr>
+          <p:cNvPr id="4" name="Picture 3"/>
+          <p:cNvPicPr>
+            <a:picLocks noChangeAspect="1"/>
+          </p:cNvPicPr>
+          <p:nvPr/>
+        </p:nvPicPr>
+        <p:blipFill>
+          <a:blip r:embed="rId2"/>
+          <a:stretch>
+            <a:fillRect/>
+          </a:stretch>
+        </p:blipFill>
+        <p:spPr>
+          <a:xfrm>
+            <a:off x="1646756" y="2500863"/>
+            <a:ext cx="7629525" cy="3524250"/>
+          </a:xfrm>
+          <a:prstGeom prst="rect">
+            <a:avLst/>
+          </a:prstGeom>
+        </p:spPr>
+      </p:pic>
+    </p:spTree>
+    <p:extLst>
+      <p:ext uri="{BB962C8B-B14F-4D97-AF65-F5344CB8AC3E}">
+        <p14:creationId xmlns:p14="http://schemas.microsoft.com/office/powerpoint/2010/main" val="465703281"/>
+      </p:ext>
+    </p:extLst>
+  </p:cSld>
+  <p:clrMapOvr>
+    <a:masterClrMapping/>
+  </p:clrMapOvr>
+</p:sld>
+</file>
+
+<file path=ppt/slides/slide4.xml><?xml version="1.0" encoding="utf-8"?>
 <p:sld xmlns:a="http://schemas.openxmlformats.org/drawingml/2006/main" xmlns:r="http://schemas.openxmlformats.org/officeDocument/2006/relationships" xmlns:p="http://schemas.openxmlformats.org/presentationml/2006/main">
   <p:cSld>
     <p:spTree>
@@ -13997,7 +17285,7 @@
 </p:sld>
 </file>
 
-<file path=ppt/slides/slide4.xml><?xml version="1.0" encoding="utf-8"?>
+<file path=ppt/slides/slide5.xml><?xml version="1.0" encoding="utf-8"?>
 <p:sld xmlns:a="http://schemas.openxmlformats.org/drawingml/2006/main" xmlns:r="http://schemas.openxmlformats.org/officeDocument/2006/relationships" xmlns:p="http://schemas.openxmlformats.org/presentationml/2006/main">
   <p:cSld>
     <p:spTree>
@@ -14104,7 +17392,7 @@
 </p:sld>
 </file>
 
-<file path=ppt/slides/slide5.xml><?xml version="1.0" encoding="utf-8"?>
+<file path=ppt/slides/slide6.xml><?xml version="1.0" encoding="utf-8"?>
 <p:sld xmlns:a="http://schemas.openxmlformats.org/drawingml/2006/main" xmlns:r="http://schemas.openxmlformats.org/officeDocument/2006/relationships" xmlns:p="http://schemas.openxmlformats.org/presentationml/2006/main">
   <p:cSld>
     <p:spTree>
@@ -14204,7 +17492,344 @@
 </p:sld>
 </file>
 
-<file path=ppt/slides/slide6.xml><?xml version="1.0" encoding="utf-8"?>
+<file path=ppt/slides/slide7.xml><?xml version="1.0" encoding="utf-8"?>
+<p:sld xmlns:a="http://schemas.openxmlformats.org/drawingml/2006/main" xmlns:r="http://schemas.openxmlformats.org/officeDocument/2006/relationships" xmlns:p="http://schemas.openxmlformats.org/presentationml/2006/main">
+  <p:cSld>
+    <p:spTree>
+      <p:nvGrpSpPr>
+        <p:cNvPr id="1" name=""/>
+        <p:cNvGrpSpPr/>
+        <p:nvPr/>
+      </p:nvGrpSpPr>
+      <p:grpSpPr>
+        <a:xfrm>
+          <a:off x="0" y="0"/>
+          <a:ext cx="0" cy="0"/>
+          <a:chOff x="0" y="0"/>
+          <a:chExt cx="0" cy="0"/>
+        </a:xfrm>
+      </p:grpSpPr>
+      <p:sp>
+        <p:nvSpPr>
+          <p:cNvPr id="2" name="Title 1"/>
+          <p:cNvSpPr>
+            <a:spLocks noGrp="1"/>
+          </p:cNvSpPr>
+          <p:nvPr>
+            <p:ph type="title"/>
+          </p:nvPr>
+        </p:nvSpPr>
+        <p:spPr/>
+        <p:txBody>
+          <a:bodyPr/>
+          <a:lstStyle/>
+          <a:p>
+            <a:r>
+              <a:rPr lang="fr-FR" smtClean="0"/>
+              <a:t>Comment cela marche ?</a:t>
+            </a:r>
+            <a:endParaRPr lang="fr-FR"/>
+          </a:p>
+        </p:txBody>
+      </p:sp>
+      <p:sp>
+        <p:nvSpPr>
+          <p:cNvPr id="4" name="Rectangle 3"/>
+          <p:cNvSpPr/>
+          <p:nvPr/>
+        </p:nvSpPr>
+        <p:spPr>
+          <a:xfrm>
+            <a:off x="4499962" y="4329404"/>
+            <a:ext cx="3197793" cy="1231641"/>
+          </a:xfrm>
+          <a:prstGeom prst="rect">
+            <a:avLst/>
+          </a:prstGeom>
+        </p:spPr>
+        <p:style>
+          <a:lnRef idx="2">
+            <a:schemeClr val="accent1">
+              <a:shade val="50000"/>
+            </a:schemeClr>
+          </a:lnRef>
+          <a:fillRef idx="1">
+            <a:schemeClr val="accent1"/>
+          </a:fillRef>
+          <a:effectRef idx="0">
+            <a:schemeClr val="accent1"/>
+          </a:effectRef>
+          <a:fontRef idx="minor">
+            <a:schemeClr val="lt1"/>
+          </a:fontRef>
+        </p:style>
+        <p:txBody>
+          <a:bodyPr rtlCol="0" anchor="ctr"/>
+          <a:lstStyle/>
+          <a:p>
+            <a:pPr algn="ctr"/>
+            <a:r>
+              <a:rPr lang="fr-FR" smtClean="0"/>
+              <a:t>Controlleur</a:t>
+            </a:r>
+            <a:endParaRPr lang="fr-FR"/>
+          </a:p>
+        </p:txBody>
+      </p:sp>
+      <p:cxnSp>
+        <p:nvCxnSpPr>
+          <p:cNvPr id="6" name="Straight Arrow Connector 5"/>
+          <p:cNvCxnSpPr>
+            <a:endCxn id="4" idx="1"/>
+          </p:cNvCxnSpPr>
+          <p:nvPr/>
+        </p:nvCxnSpPr>
+        <p:spPr>
+          <a:xfrm>
+            <a:off x="1042986" y="4907903"/>
+            <a:ext cx="3456976" cy="37322"/>
+          </a:xfrm>
+          <a:prstGeom prst="straightConnector1">
+            <a:avLst/>
+          </a:prstGeom>
+          <a:ln>
+            <a:tailEnd type="triangle"/>
+          </a:ln>
+        </p:spPr>
+        <p:style>
+          <a:lnRef idx="1">
+            <a:schemeClr val="accent1"/>
+          </a:lnRef>
+          <a:fillRef idx="0">
+            <a:schemeClr val="accent1"/>
+          </a:fillRef>
+          <a:effectRef idx="0">
+            <a:schemeClr val="accent1"/>
+          </a:effectRef>
+          <a:fontRef idx="minor">
+            <a:schemeClr val="tx1"/>
+          </a:fontRef>
+        </p:style>
+      </p:cxnSp>
+      <p:sp>
+        <p:nvSpPr>
+          <p:cNvPr id="7" name="TextBox 6"/>
+          <p:cNvSpPr txBox="1"/>
+          <p:nvPr/>
+        </p:nvSpPr>
+        <p:spPr>
+          <a:xfrm>
+            <a:off x="1129003" y="4538571"/>
+            <a:ext cx="2970685" cy="369332"/>
+          </a:xfrm>
+          <a:prstGeom prst="rect">
+            <a:avLst/>
+          </a:prstGeom>
+          <a:noFill/>
+        </p:spPr>
+        <p:txBody>
+          <a:bodyPr wrap="none" rtlCol="0">
+            <a:spAutoFit/>
+          </a:bodyPr>
+          <a:lstStyle/>
+          <a:p>
+            <a:r>
+              <a:rPr lang="fr-FR" smtClean="0"/>
+              <a:t>http://toto.com/trainings</a:t>
+            </a:r>
+            <a:endParaRPr lang="fr-FR"/>
+          </a:p>
+        </p:txBody>
+      </p:sp>
+      <p:cxnSp>
+        <p:nvCxnSpPr>
+          <p:cNvPr id="9" name="Straight Arrow Connector 8"/>
+          <p:cNvCxnSpPr/>
+          <p:nvPr/>
+        </p:nvCxnSpPr>
+        <p:spPr>
+          <a:xfrm flipH="1" flipV="1">
+            <a:off x="5402424" y="3760238"/>
+            <a:ext cx="1" cy="569167"/>
+          </a:xfrm>
+          <a:prstGeom prst="straightConnector1">
+            <a:avLst/>
+          </a:prstGeom>
+          <a:ln>
+            <a:tailEnd type="triangle"/>
+          </a:ln>
+        </p:spPr>
+        <p:style>
+          <a:lnRef idx="1">
+            <a:schemeClr val="accent1"/>
+          </a:lnRef>
+          <a:fillRef idx="0">
+            <a:schemeClr val="accent1"/>
+          </a:fillRef>
+          <a:effectRef idx="0">
+            <a:schemeClr val="accent1"/>
+          </a:effectRef>
+          <a:fontRef idx="minor">
+            <a:schemeClr val="tx1"/>
+          </a:fontRef>
+        </p:style>
+      </p:cxnSp>
+      <p:cxnSp>
+        <p:nvCxnSpPr>
+          <p:cNvPr id="11" name="Straight Arrow Connector 10"/>
+          <p:cNvCxnSpPr/>
+          <p:nvPr/>
+        </p:nvCxnSpPr>
+        <p:spPr>
+          <a:xfrm>
+            <a:off x="5769680" y="3760238"/>
+            <a:ext cx="1665" cy="569165"/>
+          </a:xfrm>
+          <a:prstGeom prst="straightConnector1">
+            <a:avLst/>
+          </a:prstGeom>
+          <a:ln>
+            <a:tailEnd type="triangle"/>
+          </a:ln>
+        </p:spPr>
+        <p:style>
+          <a:lnRef idx="1">
+            <a:schemeClr val="accent1"/>
+          </a:lnRef>
+          <a:fillRef idx="0">
+            <a:schemeClr val="accent1"/>
+          </a:fillRef>
+          <a:effectRef idx="0">
+            <a:schemeClr val="accent1"/>
+          </a:effectRef>
+          <a:fontRef idx="minor">
+            <a:schemeClr val="tx1"/>
+          </a:fontRef>
+        </p:style>
+      </p:cxnSp>
+      <p:sp>
+        <p:nvSpPr>
+          <p:cNvPr id="14" name="Rectangle 13"/>
+          <p:cNvSpPr/>
+          <p:nvPr/>
+        </p:nvSpPr>
+        <p:spPr>
+          <a:xfrm>
+            <a:off x="4499962" y="2631232"/>
+            <a:ext cx="3197793" cy="1203649"/>
+          </a:xfrm>
+          <a:prstGeom prst="rect">
+            <a:avLst/>
+          </a:prstGeom>
+        </p:spPr>
+        <p:style>
+          <a:lnRef idx="2">
+            <a:schemeClr val="accent1">
+              <a:shade val="50000"/>
+            </a:schemeClr>
+          </a:lnRef>
+          <a:fillRef idx="1">
+            <a:schemeClr val="accent1"/>
+          </a:fillRef>
+          <a:effectRef idx="0">
+            <a:schemeClr val="accent1"/>
+          </a:effectRef>
+          <a:fontRef idx="minor">
+            <a:schemeClr val="lt1"/>
+          </a:fontRef>
+        </p:style>
+        <p:txBody>
+          <a:bodyPr rtlCol="0" anchor="ctr"/>
+          <a:lstStyle/>
+          <a:p>
+            <a:pPr algn="ctr"/>
+            <a:r>
+              <a:rPr lang="fr-FR" smtClean="0"/>
+              <a:t>Modèle (Logique métier, Database)</a:t>
+            </a:r>
+            <a:endParaRPr lang="fr-FR"/>
+          </a:p>
+        </p:txBody>
+      </p:sp>
+      <p:cxnSp>
+        <p:nvCxnSpPr>
+          <p:cNvPr id="16" name="Straight Arrow Connector 15"/>
+          <p:cNvCxnSpPr>
+            <a:stCxn id="4" idx="3"/>
+          </p:cNvCxnSpPr>
+          <p:nvPr/>
+        </p:nvCxnSpPr>
+        <p:spPr>
+          <a:xfrm flipV="1">
+            <a:off x="7697755" y="4907903"/>
+            <a:ext cx="2218612" cy="37322"/>
+          </a:xfrm>
+          <a:prstGeom prst="straightConnector1">
+            <a:avLst/>
+          </a:prstGeom>
+          <a:ln>
+            <a:tailEnd type="triangle"/>
+          </a:ln>
+        </p:spPr>
+        <p:style>
+          <a:lnRef idx="1">
+            <a:schemeClr val="accent1"/>
+          </a:lnRef>
+          <a:fillRef idx="0">
+            <a:schemeClr val="accent1"/>
+          </a:fillRef>
+          <a:effectRef idx="0">
+            <a:schemeClr val="accent1"/>
+          </a:effectRef>
+          <a:fontRef idx="minor">
+            <a:schemeClr val="tx1"/>
+          </a:fontRef>
+        </p:style>
+      </p:cxnSp>
+      <p:sp>
+        <p:nvSpPr>
+          <p:cNvPr id="17" name="TextBox 16"/>
+          <p:cNvSpPr txBox="1"/>
+          <p:nvPr/>
+        </p:nvSpPr>
+        <p:spPr>
+          <a:xfrm>
+            <a:off x="7847045" y="4538571"/>
+            <a:ext cx="3605474" cy="369332"/>
+          </a:xfrm>
+          <a:prstGeom prst="rect">
+            <a:avLst/>
+          </a:prstGeom>
+          <a:noFill/>
+        </p:spPr>
+        <p:txBody>
+          <a:bodyPr wrap="none" rtlCol="0">
+            <a:spAutoFit/>
+          </a:bodyPr>
+          <a:lstStyle/>
+          <a:p>
+            <a:r>
+              <a:rPr lang="fr-FR" smtClean="0"/>
+              <a:t>Données en sortie ( JSON,XML)</a:t>
+            </a:r>
+            <a:endParaRPr lang="fr-FR"/>
+          </a:p>
+        </p:txBody>
+      </p:sp>
+    </p:spTree>
+    <p:extLst>
+      <p:ext uri="{BB962C8B-B14F-4D97-AF65-F5344CB8AC3E}">
+        <p14:creationId xmlns:p14="http://schemas.microsoft.com/office/powerpoint/2010/main" val="2837428921"/>
+      </p:ext>
+    </p:extLst>
+  </p:cSld>
+  <p:clrMapOvr>
+    <a:masterClrMapping/>
+  </p:clrMapOvr>
+</p:sld>
+</file>
+
+<file path=ppt/slides/slide8.xml><?xml version="1.0" encoding="utf-8"?>
 <p:sld xmlns:a="http://schemas.openxmlformats.org/drawingml/2006/main" xmlns:r="http://schemas.openxmlformats.org/officeDocument/2006/relationships" xmlns:p="http://schemas.openxmlformats.org/presentationml/2006/main">
   <p:cSld>
     <p:spTree>
@@ -14283,169 +17908,6 @@
 </p:sld>
 </file>
 
-<file path=ppt/slides/slide7.xml><?xml version="1.0" encoding="utf-8"?>
-<p:sld xmlns:a="http://schemas.openxmlformats.org/drawingml/2006/main" xmlns:r="http://schemas.openxmlformats.org/officeDocument/2006/relationships" xmlns:p="http://schemas.openxmlformats.org/presentationml/2006/main">
-  <p:cSld>
-    <p:spTree>
-      <p:nvGrpSpPr>
-        <p:cNvPr id="1" name=""/>
-        <p:cNvGrpSpPr/>
-        <p:nvPr/>
-      </p:nvGrpSpPr>
-      <p:grpSpPr>
-        <a:xfrm>
-          <a:off x="0" y="0"/>
-          <a:ext cx="0" cy="0"/>
-          <a:chOff x="0" y="0"/>
-          <a:chExt cx="0" cy="0"/>
-        </a:xfrm>
-      </p:grpSpPr>
-      <p:sp>
-        <p:nvSpPr>
-          <p:cNvPr id="2" name="Title 1"/>
-          <p:cNvSpPr>
-            <a:spLocks noGrp="1"/>
-          </p:cNvSpPr>
-          <p:nvPr>
-            <p:ph type="title"/>
-          </p:nvPr>
-        </p:nvSpPr>
-        <p:spPr/>
-        <p:txBody>
-          <a:bodyPr/>
-          <a:lstStyle/>
-          <a:p>
-            <a:r>
-              <a:rPr lang="fr-FR" smtClean="0"/>
-              <a:t>Démo création nouveau projet</a:t>
-            </a:r>
-            <a:endParaRPr lang="fr-FR"/>
-          </a:p>
-        </p:txBody>
-      </p:sp>
-      <p:sp>
-        <p:nvSpPr>
-          <p:cNvPr id="3" name="Content Placeholder 2"/>
-          <p:cNvSpPr>
-            <a:spLocks noGrp="1"/>
-          </p:cNvSpPr>
-          <p:nvPr>
-            <p:ph idx="1"/>
-          </p:nvPr>
-        </p:nvSpPr>
-        <p:spPr/>
-        <p:txBody>
-          <a:bodyPr/>
-          <a:lstStyle/>
-          <a:p>
-            <a:r>
-              <a:rPr lang="fr-FR" smtClean="0"/>
-              <a:t>Présentation</a:t>
-            </a:r>
-          </a:p>
-          <a:p>
-            <a:r>
-              <a:rPr lang="fr-FR" smtClean="0"/>
-              <a:t>Accéder à /api/values</a:t>
-            </a:r>
-          </a:p>
-          <a:p>
-            <a:endParaRPr lang="fr-FR"/>
-          </a:p>
-        </p:txBody>
-      </p:sp>
-    </p:spTree>
-    <p:extLst>
-      <p:ext uri="{BB962C8B-B14F-4D97-AF65-F5344CB8AC3E}">
-        <p14:creationId xmlns:p14="http://schemas.microsoft.com/office/powerpoint/2010/main" val="3086056396"/>
-      </p:ext>
-    </p:extLst>
-  </p:cSld>
-  <p:clrMapOvr>
-    <a:masterClrMapping/>
-  </p:clrMapOvr>
-</p:sld>
-</file>
-
-<file path=ppt/slides/slide8.xml><?xml version="1.0" encoding="utf-8"?>
-<p:sld xmlns:a="http://schemas.openxmlformats.org/drawingml/2006/main" xmlns:r="http://schemas.openxmlformats.org/officeDocument/2006/relationships" xmlns:p="http://schemas.openxmlformats.org/presentationml/2006/main">
-  <p:cSld>
-    <p:spTree>
-      <p:nvGrpSpPr>
-        <p:cNvPr id="1" name=""/>
-        <p:cNvGrpSpPr/>
-        <p:nvPr/>
-      </p:nvGrpSpPr>
-      <p:grpSpPr>
-        <a:xfrm>
-          <a:off x="0" y="0"/>
-          <a:ext cx="0" cy="0"/>
-          <a:chOff x="0" y="0"/>
-          <a:chExt cx="0" cy="0"/>
-        </a:xfrm>
-      </p:grpSpPr>
-      <p:sp>
-        <p:nvSpPr>
-          <p:cNvPr id="2" name="Title 1"/>
-          <p:cNvSpPr>
-            <a:spLocks noGrp="1"/>
-          </p:cNvSpPr>
-          <p:nvPr>
-            <p:ph type="title"/>
-          </p:nvPr>
-        </p:nvSpPr>
-        <p:spPr/>
-        <p:txBody>
-          <a:bodyPr/>
-          <a:lstStyle/>
-          <a:p>
-            <a:r>
-              <a:rPr lang="fr-FR" smtClean="0"/>
-              <a:t>Créer un nouveau controlleur</a:t>
-            </a:r>
-            <a:endParaRPr lang="fr-FR"/>
-          </a:p>
-        </p:txBody>
-      </p:sp>
-      <p:pic>
-        <p:nvPicPr>
-          <p:cNvPr id="4" name="Content Placeholder 3"/>
-          <p:cNvPicPr>
-            <a:picLocks noGrp="1" noChangeAspect="1"/>
-          </p:cNvPicPr>
-          <p:nvPr>
-            <p:ph idx="1"/>
-          </p:nvPr>
-        </p:nvPicPr>
-        <p:blipFill>
-          <a:blip r:embed="rId2"/>
-          <a:stretch>
-            <a:fillRect/>
-          </a:stretch>
-        </p:blipFill>
-        <p:spPr>
-          <a:xfrm>
-            <a:off x="2772035" y="2603500"/>
-            <a:ext cx="5592242" cy="3416300"/>
-          </a:xfrm>
-          <a:prstGeom prst="rect">
-            <a:avLst/>
-          </a:prstGeom>
-        </p:spPr>
-      </p:pic>
-    </p:spTree>
-    <p:extLst>
-      <p:ext uri="{BB962C8B-B14F-4D97-AF65-F5344CB8AC3E}">
-        <p14:creationId xmlns:p14="http://schemas.microsoft.com/office/powerpoint/2010/main" val="1990699872"/>
-      </p:ext>
-    </p:extLst>
-  </p:cSld>
-  <p:clrMapOvr>
-    <a:masterClrMapping/>
-  </p:clrMapOvr>
-</p:sld>
-</file>
-
 <file path=ppt/slides/slide9.xml><?xml version="1.0" encoding="utf-8"?>
 <p:sld xmlns:a="http://schemas.openxmlformats.org/drawingml/2006/main" xmlns:r="http://schemas.openxmlformats.org/officeDocument/2006/relationships" xmlns:p="http://schemas.openxmlformats.org/presentationml/2006/main">
   <p:cSld>
@@ -14480,7 +17942,7 @@
           <a:p>
             <a:r>
               <a:rPr lang="fr-FR" smtClean="0"/>
-              <a:t>Serialisation</a:t>
+              <a:t>Démo création nouveau projet</a:t>
             </a:r>
             <a:endParaRPr lang="fr-FR"/>
           </a:p>
@@ -14503,14 +17965,16 @@
           <a:p>
             <a:r>
               <a:rPr lang="fr-FR" smtClean="0"/>
-              <a:t>WebApi va retourner nativement els données dans le format dans le quel on lui demande</a:t>
+              <a:t>Présentation</a:t>
             </a:r>
           </a:p>
           <a:p>
             <a:r>
               <a:rPr lang="fr-FR" smtClean="0"/>
-              <a:t>Le client spécifie son format préféré de données dans le champ Accept.</a:t>
-            </a:r>
+              <a:t>Accéder à /api/values</a:t>
+            </a:r>
+          </a:p>
+          <a:p>
             <a:endParaRPr lang="fr-FR"/>
           </a:p>
         </p:txBody>
@@ -14518,7 +17982,7 @@
     </p:spTree>
     <p:extLst>
       <p:ext uri="{BB962C8B-B14F-4D97-AF65-F5344CB8AC3E}">
-        <p14:creationId xmlns:p14="http://schemas.microsoft.com/office/powerpoint/2010/main" val="2383675836"/>
+        <p14:creationId xmlns:p14="http://schemas.microsoft.com/office/powerpoint/2010/main" val="3086056396"/>
       </p:ext>
     </p:extLst>
   </p:cSld>

</xml_diff>